<commit_message>
Update Kubernetes Service Proxy
</commit_message>
<xml_diff>
--- a/images/theory_analysis/Kubernetes_Service_Proxy/Kubernetes_Service_Proxy.pptx
+++ b/images/theory_analysis/Kubernetes_Service_Proxy/Kubernetes_Service_Proxy.pptx
@@ -5,15 +5,16 @@
     <p:sldMasterId id="2147483648" r:id="rId1"/>
   </p:sldMasterIdLst>
   <p:notesMasterIdLst>
-    <p:notesMasterId r:id="rId8"/>
+    <p:notesMasterId r:id="rId9"/>
   </p:notesMasterIdLst>
   <p:sldIdLst>
     <p:sldId id="366" r:id="rId2"/>
     <p:sldId id="363" r:id="rId3"/>
-    <p:sldId id="367" r:id="rId4"/>
+    <p:sldId id="368" r:id="rId4"/>
     <p:sldId id="365" r:id="rId5"/>
-    <p:sldId id="362" r:id="rId6"/>
-    <p:sldId id="364" r:id="rId7"/>
+    <p:sldId id="367" r:id="rId6"/>
+    <p:sldId id="362" r:id="rId7"/>
+    <p:sldId id="364" r:id="rId8"/>
   </p:sldIdLst>
   <p:sldSz cx="9144000" cy="5143500" type="screen16x9"/>
   <p:notesSz cx="6858000" cy="9144000"/>
@@ -643,7 +644,7 @@
     </p:spTree>
     <p:extLst>
       <p:ext uri="{BB962C8B-B14F-4D97-AF65-F5344CB8AC3E}">
-        <p14:creationId xmlns:p14="http://schemas.microsoft.com/office/powerpoint/2010/main" val="2367882658"/>
+        <p14:creationId xmlns:p14="http://schemas.microsoft.com/office/powerpoint/2010/main" val="3322830449"/>
       </p:ext>
     </p:extLst>
   </p:cSld>
@@ -727,7 +728,7 @@
     </p:spTree>
     <p:extLst>
       <p:ext uri="{BB962C8B-B14F-4D97-AF65-F5344CB8AC3E}">
-        <p14:creationId xmlns:p14="http://schemas.microsoft.com/office/powerpoint/2010/main" val="812539306"/>
+        <p14:creationId xmlns:p14="http://schemas.microsoft.com/office/powerpoint/2010/main" val="2367882658"/>
       </p:ext>
     </p:extLst>
   </p:cSld>
@@ -803,6 +804,90 @@
             <a:fld id="{BA5DFA43-8D57-47FB-BC46-057616015C3B}" type="slidenum">
               <a:rPr lang="ko-KR" altLang="en-US" smtClean="0"/>
               <a:t>6</a:t>
+            </a:fld>
+            <a:endParaRPr lang="ko-KR" altLang="en-US"/>
+          </a:p>
+        </p:txBody>
+      </p:sp>
+    </p:spTree>
+    <p:extLst>
+      <p:ext uri="{BB962C8B-B14F-4D97-AF65-F5344CB8AC3E}">
+        <p14:creationId xmlns:p14="http://schemas.microsoft.com/office/powerpoint/2010/main" val="812539306"/>
+      </p:ext>
+    </p:extLst>
+  </p:cSld>
+  <p:clrMapOvr>
+    <a:masterClrMapping/>
+  </p:clrMapOvr>
+</p:notes>
+</file>
+
+<file path=ppt/notesSlides/notesSlide5.xml><?xml version="1.0" encoding="utf-8"?>
+<p:notes xmlns:a="http://schemas.openxmlformats.org/drawingml/2006/main" xmlns:r="http://schemas.openxmlformats.org/officeDocument/2006/relationships" xmlns:p="http://schemas.openxmlformats.org/presentationml/2006/main">
+  <p:cSld>
+    <p:spTree>
+      <p:nvGrpSpPr>
+        <p:cNvPr id="1" name=""/>
+        <p:cNvGrpSpPr/>
+        <p:nvPr/>
+      </p:nvGrpSpPr>
+      <p:grpSpPr>
+        <a:xfrm>
+          <a:off x="0" y="0"/>
+          <a:ext cx="0" cy="0"/>
+          <a:chOff x="0" y="0"/>
+          <a:chExt cx="0" cy="0"/>
+        </a:xfrm>
+      </p:grpSpPr>
+      <p:sp>
+        <p:nvSpPr>
+          <p:cNvPr id="2" name="슬라이드 이미지 개체 틀 1"/>
+          <p:cNvSpPr>
+            <a:spLocks noGrp="1" noRot="1" noChangeAspect="1"/>
+          </p:cNvSpPr>
+          <p:nvPr>
+            <p:ph type="sldImg"/>
+          </p:nvPr>
+        </p:nvSpPr>
+        <p:spPr/>
+      </p:sp>
+      <p:sp>
+        <p:nvSpPr>
+          <p:cNvPr id="3" name="슬라이드 노트 개체 틀 2"/>
+          <p:cNvSpPr>
+            <a:spLocks noGrp="1"/>
+          </p:cNvSpPr>
+          <p:nvPr>
+            <p:ph type="body" idx="1"/>
+          </p:nvPr>
+        </p:nvSpPr>
+        <p:spPr/>
+        <p:txBody>
+          <a:bodyPr/>
+          <a:lstStyle/>
+          <a:p>
+            <a:endParaRPr lang="ko-KR" altLang="en-US"/>
+          </a:p>
+        </p:txBody>
+      </p:sp>
+      <p:sp>
+        <p:nvSpPr>
+          <p:cNvPr id="4" name="슬라이드 번호 개체 틀 3"/>
+          <p:cNvSpPr>
+            <a:spLocks noGrp="1"/>
+          </p:cNvSpPr>
+          <p:nvPr>
+            <p:ph type="sldNum" sz="quarter" idx="10"/>
+          </p:nvPr>
+        </p:nvSpPr>
+        <p:spPr/>
+        <p:txBody>
+          <a:bodyPr/>
+          <a:lstStyle/>
+          <a:p>
+            <a:fld id="{BA5DFA43-8D57-47FB-BC46-057616015C3B}" type="slidenum">
+              <a:rPr lang="ko-KR" altLang="en-US" smtClean="0"/>
+              <a:t>7</a:t>
             </a:fld>
             <a:endParaRPr lang="ko-KR" altLang="en-US"/>
           </a:p>
@@ -3788,116 +3873,6 @@
       </p:sp>
       <p:sp>
         <p:nvSpPr>
-          <p:cNvPr id="34" name="모서리가 둥근 직사각형 13">
-            <a:extLst>
-              <a:ext uri="{FF2B5EF4-FFF2-40B4-BE49-F238E27FC236}">
-                <a16:creationId xmlns:a16="http://schemas.microsoft.com/office/drawing/2014/main" id="{6E702868-5116-437A-928A-AA39955F878D}"/>
-              </a:ext>
-            </a:extLst>
-          </p:cNvPr>
-          <p:cNvSpPr/>
-          <p:nvPr/>
-        </p:nvSpPr>
-        <p:spPr>
-          <a:xfrm>
-            <a:off x="557516" y="7396962"/>
-            <a:ext cx="1773332" cy="359364"/>
-          </a:xfrm>
-          <a:prstGeom prst="roundRect">
-            <a:avLst>
-              <a:gd name="adj" fmla="val 10708"/>
-            </a:avLst>
-          </a:prstGeom>
-          <a:ln>
-            <a:solidFill>
-              <a:schemeClr val="tx2"/>
-            </a:solidFill>
-          </a:ln>
-        </p:spPr>
-        <p:style>
-          <a:lnRef idx="2">
-            <a:schemeClr val="dk1"/>
-          </a:lnRef>
-          <a:fillRef idx="1">
-            <a:schemeClr val="lt1"/>
-          </a:fillRef>
-          <a:effectRef idx="0">
-            <a:schemeClr val="dk1"/>
-          </a:effectRef>
-          <a:fontRef idx="minor">
-            <a:schemeClr val="dk1"/>
-          </a:fontRef>
-        </p:style>
-        <p:txBody>
-          <a:bodyPr rtlCol="0" anchor="ctr"/>
-          <a:lstStyle/>
-          <a:p>
-            <a:pPr algn="ctr"/>
-            <a:r>
-              <a:rPr lang="en-US" altLang="ko-KR" sz="1200">
-                <a:solidFill>
-                  <a:schemeClr val="tx2"/>
-                </a:solidFill>
-              </a:rPr>
-              <a:t>Destination</a:t>
-            </a:r>
-          </a:p>
-          <a:p>
-            <a:pPr algn="ctr"/>
-            <a:r>
-              <a:rPr lang="en-US" altLang="ko-KR" sz="1200">
-                <a:solidFill>
-                  <a:schemeClr val="tx2"/>
-                </a:solidFill>
-              </a:rPr>
-              <a:t>(Node, Pod)</a:t>
-            </a:r>
-            <a:endParaRPr lang="ko-KR" altLang="en-US" sz="1200">
-              <a:solidFill>
-                <a:schemeClr val="tx2"/>
-              </a:solidFill>
-            </a:endParaRPr>
-          </a:p>
-        </p:txBody>
-      </p:sp>
-      <p:sp>
-        <p:nvSpPr>
-          <p:cNvPr id="5" name="TextBox 4">
-            <a:extLst>
-              <a:ext uri="{FF2B5EF4-FFF2-40B4-BE49-F238E27FC236}">
-                <a16:creationId xmlns:a16="http://schemas.microsoft.com/office/drawing/2014/main" id="{37908E87-825F-4712-8F1B-263C9866F53B}"/>
-              </a:ext>
-            </a:extLst>
-          </p:cNvPr>
-          <p:cNvSpPr txBox="1"/>
-          <p:nvPr/>
-        </p:nvSpPr>
-        <p:spPr>
-          <a:xfrm>
-            <a:off x="6860619" y="7422755"/>
-            <a:ext cx="1700337" cy="307777"/>
-          </a:xfrm>
-          <a:prstGeom prst="rect">
-            <a:avLst/>
-          </a:prstGeom>
-          <a:noFill/>
-        </p:spPr>
-        <p:txBody>
-          <a:bodyPr wrap="none" rtlCol="0">
-            <a:spAutoFit/>
-          </a:bodyPr>
-          <a:lstStyle/>
-          <a:p>
-            <a:r>
-              <a:rPr lang="en-US" altLang="ko-KR" sz="1400"/>
-              <a:t>iptables NAT Table</a:t>
-            </a:r>
-            <a:endParaRPr lang="ko-KR" altLang="en-US" sz="1400"/>
-          </a:p>
-        </p:txBody>
-      </p:sp>
-      <p:sp>
-        <p:nvSpPr>
           <p:cNvPr id="37" name="사각형: 둥근 모서리 36">
             <a:extLst>
               <a:ext uri="{FF2B5EF4-FFF2-40B4-BE49-F238E27FC236}">
@@ -4585,7 +4560,7 @@
           <a:prstGeom prst="straightConnector1">
             <a:avLst/>
           </a:prstGeom>
-          <a:ln w="19050">
+          <a:ln w="28575">
             <a:solidFill>
               <a:schemeClr val="tx1"/>
             </a:solidFill>
@@ -4631,7 +4606,7 @@
           <a:prstGeom prst="straightConnector1">
             <a:avLst/>
           </a:prstGeom>
-          <a:ln w="19050">
+          <a:ln w="28575">
             <a:solidFill>
               <a:schemeClr val="tx1"/>
             </a:solidFill>
@@ -4735,7 +4710,7 @@
           <a:prstGeom prst="straightConnector1">
             <a:avLst/>
           </a:prstGeom>
-          <a:ln w="19050">
+          <a:ln w="28575">
             <a:solidFill>
               <a:schemeClr val="tx1"/>
             </a:solidFill>
@@ -4781,7 +4756,7 @@
           <a:prstGeom prst="straightConnector1">
             <a:avLst/>
           </a:prstGeom>
-          <a:ln w="19050">
+          <a:ln w="28575">
             <a:solidFill>
               <a:schemeClr val="tx1"/>
             </a:solidFill>
@@ -5010,7 +4985,7 @@
           <a:prstGeom prst="straightConnector1">
             <a:avLst/>
           </a:prstGeom>
-          <a:ln w="19050">
+          <a:ln w="28575">
             <a:solidFill>
               <a:srgbClr val="C00000"/>
             </a:solidFill>
@@ -5032,100 +5007,6 @@
           </a:fontRef>
         </p:style>
       </p:cxnSp>
-      <p:sp>
-        <p:nvSpPr>
-          <p:cNvPr id="132" name="TextBox 131">
-            <a:extLst>
-              <a:ext uri="{FF2B5EF4-FFF2-40B4-BE49-F238E27FC236}">
-                <a16:creationId xmlns:a16="http://schemas.microsoft.com/office/drawing/2014/main" id="{A2D330F9-3AF6-4AFD-BDFA-5A9D10B03381}"/>
-              </a:ext>
-            </a:extLst>
-          </p:cNvPr>
-          <p:cNvSpPr txBox="1"/>
-          <p:nvPr/>
-        </p:nvSpPr>
-        <p:spPr>
-          <a:xfrm>
-            <a:off x="1665290" y="3023098"/>
-            <a:ext cx="892809" cy="276999"/>
-          </a:xfrm>
-          <a:prstGeom prst="rect">
-            <a:avLst/>
-          </a:prstGeom>
-          <a:noFill/>
-        </p:spPr>
-        <p:txBody>
-          <a:bodyPr wrap="none" rtlCol="0" anchor="ctr">
-            <a:spAutoFit/>
-          </a:bodyPr>
-          <a:lstStyle/>
-          <a:p>
-            <a:pPr algn="ctr"/>
-            <a:r>
-              <a:rPr lang="en-US" altLang="ko-KR" sz="1200" b="1">
-                <a:solidFill>
-                  <a:schemeClr val="accent3">
-                    <a:lumMod val="50000"/>
-                  </a:schemeClr>
-                </a:solidFill>
-              </a:rPr>
-              <a:t>NodePort</a:t>
-            </a:r>
-            <a:endParaRPr lang="ko-KR" altLang="en-US" sz="1200" b="1">
-              <a:solidFill>
-                <a:schemeClr val="accent3">
-                  <a:lumMod val="50000"/>
-                </a:schemeClr>
-              </a:solidFill>
-            </a:endParaRPr>
-          </a:p>
-        </p:txBody>
-      </p:sp>
-      <p:sp>
-        <p:nvSpPr>
-          <p:cNvPr id="133" name="TextBox 132">
-            <a:extLst>
-              <a:ext uri="{FF2B5EF4-FFF2-40B4-BE49-F238E27FC236}">
-                <a16:creationId xmlns:a16="http://schemas.microsoft.com/office/drawing/2014/main" id="{1CFFA1AE-04C5-4A0E-A023-159F12D252D0}"/>
-              </a:ext>
-            </a:extLst>
-          </p:cNvPr>
-          <p:cNvSpPr txBox="1"/>
-          <p:nvPr/>
-        </p:nvSpPr>
-        <p:spPr>
-          <a:xfrm>
-            <a:off x="2528324" y="3041892"/>
-            <a:ext cx="834780" cy="276999"/>
-          </a:xfrm>
-          <a:prstGeom prst="rect">
-            <a:avLst/>
-          </a:prstGeom>
-          <a:noFill/>
-        </p:spPr>
-        <p:txBody>
-          <a:bodyPr wrap="none" rtlCol="0" anchor="ctr">
-            <a:spAutoFit/>
-          </a:bodyPr>
-          <a:lstStyle/>
-          <a:p>
-            <a:pPr algn="ctr"/>
-            <a:r>
-              <a:rPr lang="en-US" altLang="ko-KR" sz="1200" b="1">
-                <a:solidFill>
-                  <a:srgbClr val="C00000"/>
-                </a:solidFill>
-              </a:rPr>
-              <a:t>ClusterIP</a:t>
-            </a:r>
-            <a:endParaRPr lang="ko-KR" altLang="en-US" sz="1200" b="1">
-              <a:solidFill>
-                <a:srgbClr val="C00000"/>
-              </a:solidFill>
-            </a:endParaRPr>
-          </a:p>
-        </p:txBody>
-      </p:sp>
       <p:sp>
         <p:nvSpPr>
           <p:cNvPr id="136" name="사각형: 둥근 모서리 135">
@@ -5320,7 +5201,7 @@
           <a:prstGeom prst="straightConnector1">
             <a:avLst/>
           </a:prstGeom>
-          <a:ln w="19050">
+          <a:ln w="28575">
             <a:solidFill>
               <a:schemeClr val="tx1"/>
             </a:solidFill>
@@ -5366,7 +5247,7 @@
           <a:prstGeom prst="straightConnector1">
             <a:avLst/>
           </a:prstGeom>
-          <a:ln w="19050">
+          <a:ln w="28575">
             <a:solidFill>
               <a:schemeClr val="tx1"/>
             </a:solidFill>
@@ -5412,7 +5293,7 @@
           <a:prstGeom prst="straightConnector1">
             <a:avLst/>
           </a:prstGeom>
-          <a:ln w="19050">
+          <a:ln w="28575">
             <a:solidFill>
               <a:schemeClr val="tx1"/>
             </a:solidFill>
@@ -5458,7 +5339,7 @@
           <a:prstGeom prst="straightConnector1">
             <a:avLst/>
           </a:prstGeom>
-          <a:ln w="19050">
+          <a:ln w="28575">
             <a:solidFill>
               <a:schemeClr val="tx1"/>
             </a:solidFill>
@@ -5503,7 +5384,7 @@
           <a:prstGeom prst="straightConnector1">
             <a:avLst/>
           </a:prstGeom>
-          <a:ln w="19050">
+          <a:ln w="28575">
             <a:solidFill>
               <a:schemeClr val="tx1"/>
             </a:solidFill>
@@ -5549,7 +5430,7 @@
           <a:prstGeom prst="straightConnector1">
             <a:avLst/>
           </a:prstGeom>
-          <a:ln w="19050">
+          <a:ln w="28575">
             <a:solidFill>
               <a:schemeClr val="accent3">
                 <a:lumMod val="50000"/>
@@ -5597,7 +5478,7 @@
           <a:prstGeom prst="straightConnector1">
             <a:avLst/>
           </a:prstGeom>
-          <a:ln w="19050">
+          <a:ln w="28575">
             <a:solidFill>
               <a:schemeClr val="accent3">
                 <a:lumMod val="50000"/>
@@ -5621,97 +5502,118 @@
           </a:fontRef>
         </p:style>
       </p:cxnSp>
-      <p:sp>
-        <p:nvSpPr>
-          <p:cNvPr id="185" name="사각형: 둥근 모서리 184">
-            <a:extLst>
-              <a:ext uri="{FF2B5EF4-FFF2-40B4-BE49-F238E27FC236}">
-                <a16:creationId xmlns:a16="http://schemas.microsoft.com/office/drawing/2014/main" id="{649D29CC-3602-44ED-B93E-929A63D28CFF}"/>
-              </a:ext>
-            </a:extLst>
-          </p:cNvPr>
-          <p:cNvSpPr/>
-          <p:nvPr/>
-        </p:nvSpPr>
-        <p:spPr>
-          <a:xfrm>
-            <a:off x="1359495" y="4808794"/>
-            <a:ext cx="576064" cy="157134"/>
-          </a:xfrm>
-          <a:prstGeom prst="roundRect">
-            <a:avLst>
-              <a:gd name="adj" fmla="val 15087"/>
-            </a:avLst>
-          </a:prstGeom>
-          <a:ln>
-            <a:solidFill>
-              <a:schemeClr val="tx2"/>
-            </a:solidFill>
-          </a:ln>
-        </p:spPr>
-        <p:style>
-          <a:lnRef idx="2">
-            <a:schemeClr val="dk1"/>
-          </a:lnRef>
-          <a:fillRef idx="1">
-            <a:schemeClr val="lt1"/>
-          </a:fillRef>
-          <a:effectRef idx="0">
-            <a:schemeClr val="dk1"/>
-          </a:effectRef>
-          <a:fontRef idx="minor">
-            <a:schemeClr val="dk1"/>
-          </a:fontRef>
-        </p:style>
-        <p:txBody>
-          <a:bodyPr rtlCol="0" anchor="ctr"/>
-          <a:lstStyle/>
-          <a:p>
-            <a:pPr algn="ctr"/>
-            <a:endParaRPr lang="en-US" altLang="ko-KR" sz="1200">
+      <p:grpSp>
+        <p:nvGrpSpPr>
+          <p:cNvPr id="8" name="그룹 7">
+            <a:extLst>
+              <a:ext uri="{FF2B5EF4-FFF2-40B4-BE49-F238E27FC236}">
+                <a16:creationId xmlns:a16="http://schemas.microsoft.com/office/drawing/2014/main" id="{7C9388C1-8F84-49D6-9FE6-8F1050E15C1D}"/>
+              </a:ext>
+            </a:extLst>
+          </p:cNvPr>
+          <p:cNvGrpSpPr/>
+          <p:nvPr/>
+        </p:nvGrpSpPr>
+        <p:grpSpPr>
+          <a:xfrm>
+            <a:off x="1547664" y="4764287"/>
+            <a:ext cx="1795015" cy="276999"/>
+            <a:chOff x="1600199" y="4764287"/>
+            <a:chExt cx="1795015" cy="276999"/>
+          </a:xfrm>
+        </p:grpSpPr>
+        <p:sp>
+          <p:nvSpPr>
+            <p:cNvPr id="185" name="사각형: 둥근 모서리 184">
+              <a:extLst>
+                <a:ext uri="{FF2B5EF4-FFF2-40B4-BE49-F238E27FC236}">
+                  <a16:creationId xmlns:a16="http://schemas.microsoft.com/office/drawing/2014/main" id="{649D29CC-3602-44ED-B93E-929A63D28CFF}"/>
+                </a:ext>
+              </a:extLst>
+            </p:cNvPr>
+            <p:cNvSpPr/>
+            <p:nvPr/>
+          </p:nvSpPr>
+          <p:spPr>
+            <a:xfrm>
+              <a:off x="1600199" y="4823198"/>
+              <a:ext cx="310953" cy="160282"/>
+            </a:xfrm>
+            <a:prstGeom prst="roundRect">
+              <a:avLst>
+                <a:gd name="adj" fmla="val 15087"/>
+              </a:avLst>
+            </a:prstGeom>
+            <a:ln>
               <a:solidFill>
                 <a:schemeClr val="tx2"/>
               </a:solidFill>
-            </a:endParaRPr>
-          </a:p>
-        </p:txBody>
-      </p:sp>
-      <p:sp>
-        <p:nvSpPr>
-          <p:cNvPr id="186" name="TextBox 185">
-            <a:extLst>
-              <a:ext uri="{FF2B5EF4-FFF2-40B4-BE49-F238E27FC236}">
-                <a16:creationId xmlns:a16="http://schemas.microsoft.com/office/drawing/2014/main" id="{DCF370FF-123C-4565-BF35-4E7AB2F877C3}"/>
-              </a:ext>
-            </a:extLst>
-          </p:cNvPr>
-          <p:cNvSpPr txBox="1"/>
-          <p:nvPr/>
-        </p:nvSpPr>
-        <p:spPr>
-          <a:xfrm>
-            <a:off x="1935559" y="4731990"/>
-            <a:ext cx="1700337" cy="307777"/>
-          </a:xfrm>
-          <a:prstGeom prst="rect">
-            <a:avLst/>
-          </a:prstGeom>
-          <a:noFill/>
-        </p:spPr>
-        <p:txBody>
-          <a:bodyPr wrap="none" rtlCol="0">
-            <a:spAutoFit/>
-          </a:bodyPr>
-          <a:lstStyle/>
-          <a:p>
-            <a:r>
-              <a:rPr lang="en-US" altLang="ko-KR" sz="1400"/>
-              <a:t>iptables NAT Table</a:t>
-            </a:r>
-            <a:endParaRPr lang="ko-KR" altLang="en-US" sz="1400"/>
-          </a:p>
-        </p:txBody>
-      </p:sp>
+            </a:ln>
+          </p:spPr>
+          <p:style>
+            <a:lnRef idx="2">
+              <a:schemeClr val="dk1"/>
+            </a:lnRef>
+            <a:fillRef idx="1">
+              <a:schemeClr val="lt1"/>
+            </a:fillRef>
+            <a:effectRef idx="0">
+              <a:schemeClr val="dk1"/>
+            </a:effectRef>
+            <a:fontRef idx="minor">
+              <a:schemeClr val="dk1"/>
+            </a:fontRef>
+          </p:style>
+          <p:txBody>
+            <a:bodyPr rtlCol="0" anchor="ctr"/>
+            <a:lstStyle/>
+            <a:p>
+              <a:pPr algn="ctr"/>
+              <a:endParaRPr lang="en-US" altLang="ko-KR" sz="1200">
+                <a:solidFill>
+                  <a:schemeClr val="tx2"/>
+                </a:solidFill>
+              </a:endParaRPr>
+            </a:p>
+          </p:txBody>
+        </p:sp>
+        <p:sp>
+          <p:nvSpPr>
+            <p:cNvPr id="186" name="TextBox 185">
+              <a:extLst>
+                <a:ext uri="{FF2B5EF4-FFF2-40B4-BE49-F238E27FC236}">
+                  <a16:creationId xmlns:a16="http://schemas.microsoft.com/office/drawing/2014/main" id="{DCF370FF-123C-4565-BF35-4E7AB2F877C3}"/>
+                </a:ext>
+              </a:extLst>
+            </p:cNvPr>
+            <p:cNvSpPr txBox="1"/>
+            <p:nvPr/>
+          </p:nvSpPr>
+          <p:spPr>
+            <a:xfrm>
+              <a:off x="1911153" y="4764287"/>
+              <a:ext cx="1484061" cy="276999"/>
+            </a:xfrm>
+            <a:prstGeom prst="rect">
+              <a:avLst/>
+            </a:prstGeom>
+            <a:noFill/>
+          </p:spPr>
+          <p:txBody>
+            <a:bodyPr wrap="none" rtlCol="0">
+              <a:spAutoFit/>
+            </a:bodyPr>
+            <a:lstStyle/>
+            <a:p>
+              <a:r>
+                <a:rPr lang="en-US" altLang="ko-KR" sz="1200"/>
+                <a:t>iptables NAT Table</a:t>
+              </a:r>
+              <a:endParaRPr lang="ko-KR" altLang="en-US" sz="1200"/>
+            </a:p>
+          </p:txBody>
+        </p:sp>
+      </p:grpSp>
       <p:sp>
         <p:nvSpPr>
           <p:cNvPr id="187" name="자유형: 도형 186">
@@ -5791,7 +5693,7 @@
             </a:pathLst>
           </a:custGeom>
           <a:noFill/>
-          <a:ln>
+          <a:ln w="28575">
             <a:solidFill>
               <a:schemeClr val="tx1"/>
             </a:solidFill>
@@ -5824,6 +5726,311 @@
           </a:p>
         </p:txBody>
       </p:sp>
+      <p:grpSp>
+        <p:nvGrpSpPr>
+          <p:cNvPr id="7" name="그룹 6">
+            <a:extLst>
+              <a:ext uri="{FF2B5EF4-FFF2-40B4-BE49-F238E27FC236}">
+                <a16:creationId xmlns:a16="http://schemas.microsoft.com/office/drawing/2014/main" id="{E3611F14-5F74-42F2-A5EF-A30047F89DBC}"/>
+              </a:ext>
+            </a:extLst>
+          </p:cNvPr>
+          <p:cNvGrpSpPr/>
+          <p:nvPr/>
+        </p:nvGrpSpPr>
+        <p:grpSpPr>
+          <a:xfrm>
+            <a:off x="3491880" y="4755407"/>
+            <a:ext cx="2023124" cy="276999"/>
+            <a:chOff x="3419872" y="4755407"/>
+            <a:chExt cx="2023124" cy="276999"/>
+          </a:xfrm>
+        </p:grpSpPr>
+        <p:cxnSp>
+          <p:nvCxnSpPr>
+            <p:cNvPr id="44" name="직선 화살표 연결선 43">
+              <a:extLst>
+                <a:ext uri="{FF2B5EF4-FFF2-40B4-BE49-F238E27FC236}">
+                  <a16:creationId xmlns:a16="http://schemas.microsoft.com/office/drawing/2014/main" id="{B2743E7F-27C1-4909-BBD1-FF4618946A3A}"/>
+                </a:ext>
+              </a:extLst>
+            </p:cNvPr>
+            <p:cNvCxnSpPr>
+              <a:cxnSpLocks/>
+            </p:cNvCxnSpPr>
+            <p:nvPr/>
+          </p:nvCxnSpPr>
+          <p:spPr>
+            <a:xfrm>
+              <a:off x="3419872" y="4898028"/>
+              <a:ext cx="284571" cy="0"/>
+            </a:xfrm>
+            <a:prstGeom prst="straightConnector1">
+              <a:avLst/>
+            </a:prstGeom>
+            <a:ln w="28575">
+              <a:solidFill>
+                <a:schemeClr val="tx1"/>
+              </a:solidFill>
+              <a:tailEnd type="arrow"/>
+            </a:ln>
+          </p:spPr>
+          <p:style>
+            <a:lnRef idx="1">
+              <a:schemeClr val="accent1"/>
+            </a:lnRef>
+            <a:fillRef idx="0">
+              <a:schemeClr val="accent1"/>
+            </a:fillRef>
+            <a:effectRef idx="0">
+              <a:schemeClr val="accent1"/>
+            </a:effectRef>
+            <a:fontRef idx="minor">
+              <a:schemeClr val="tx1"/>
+            </a:fontRef>
+          </p:style>
+        </p:cxnSp>
+        <p:sp>
+          <p:nvSpPr>
+            <p:cNvPr id="46" name="TextBox 45">
+              <a:extLst>
+                <a:ext uri="{FF2B5EF4-FFF2-40B4-BE49-F238E27FC236}">
+                  <a16:creationId xmlns:a16="http://schemas.microsoft.com/office/drawing/2014/main" id="{A9215B4F-89BE-4AA0-9757-E28A145DD27F}"/>
+                </a:ext>
+              </a:extLst>
+            </p:cNvPr>
+            <p:cNvSpPr txBox="1"/>
+            <p:nvPr/>
+          </p:nvSpPr>
+          <p:spPr>
+            <a:xfrm>
+              <a:off x="3704443" y="4755407"/>
+              <a:ext cx="1738553" cy="276999"/>
+            </a:xfrm>
+            <a:prstGeom prst="rect">
+              <a:avLst/>
+            </a:prstGeom>
+            <a:noFill/>
+          </p:spPr>
+          <p:txBody>
+            <a:bodyPr wrap="none" rtlCol="0">
+              <a:spAutoFit/>
+            </a:bodyPr>
+            <a:lstStyle/>
+            <a:p>
+              <a:r>
+                <a:rPr lang="en-US" altLang="ko-KR" sz="1200"/>
+                <a:t>ClusterIP + NodePort</a:t>
+              </a:r>
+              <a:endParaRPr lang="ko-KR" altLang="en-US" sz="1200"/>
+            </a:p>
+          </p:txBody>
+        </p:sp>
+      </p:grpSp>
+      <p:grpSp>
+        <p:nvGrpSpPr>
+          <p:cNvPr id="6" name="그룹 5">
+            <a:extLst>
+              <a:ext uri="{FF2B5EF4-FFF2-40B4-BE49-F238E27FC236}">
+                <a16:creationId xmlns:a16="http://schemas.microsoft.com/office/drawing/2014/main" id="{2D966F96-6E0C-497A-97BD-019035DF663E}"/>
+              </a:ext>
+            </a:extLst>
+          </p:cNvPr>
+          <p:cNvGrpSpPr/>
+          <p:nvPr/>
+        </p:nvGrpSpPr>
+        <p:grpSpPr>
+          <a:xfrm>
+            <a:off x="5580112" y="4755407"/>
+            <a:ext cx="1080302" cy="276999"/>
+            <a:chOff x="5371509" y="4755407"/>
+            <a:chExt cx="1080302" cy="276999"/>
+          </a:xfrm>
+        </p:grpSpPr>
+        <p:cxnSp>
+          <p:nvCxnSpPr>
+            <p:cNvPr id="47" name="직선 화살표 연결선 46">
+              <a:extLst>
+                <a:ext uri="{FF2B5EF4-FFF2-40B4-BE49-F238E27FC236}">
+                  <a16:creationId xmlns:a16="http://schemas.microsoft.com/office/drawing/2014/main" id="{45463F05-43F2-48DB-AF88-3EA762B883BB}"/>
+                </a:ext>
+              </a:extLst>
+            </p:cNvPr>
+            <p:cNvCxnSpPr>
+              <a:cxnSpLocks/>
+            </p:cNvCxnSpPr>
+            <p:nvPr/>
+          </p:nvCxnSpPr>
+          <p:spPr>
+            <a:xfrm>
+              <a:off x="5371509" y="4898028"/>
+              <a:ext cx="284571" cy="0"/>
+            </a:xfrm>
+            <a:prstGeom prst="straightConnector1">
+              <a:avLst/>
+            </a:prstGeom>
+            <a:ln w="28575">
+              <a:solidFill>
+                <a:srgbClr val="C00000"/>
+              </a:solidFill>
+              <a:tailEnd type="arrow"/>
+            </a:ln>
+          </p:spPr>
+          <p:style>
+            <a:lnRef idx="1">
+              <a:schemeClr val="accent1"/>
+            </a:lnRef>
+            <a:fillRef idx="0">
+              <a:schemeClr val="accent1"/>
+            </a:fillRef>
+            <a:effectRef idx="0">
+              <a:schemeClr val="accent1"/>
+            </a:effectRef>
+            <a:fontRef idx="minor">
+              <a:schemeClr val="tx1"/>
+            </a:fontRef>
+          </p:style>
+        </p:cxnSp>
+        <p:sp>
+          <p:nvSpPr>
+            <p:cNvPr id="48" name="TextBox 47">
+              <a:extLst>
+                <a:ext uri="{FF2B5EF4-FFF2-40B4-BE49-F238E27FC236}">
+                  <a16:creationId xmlns:a16="http://schemas.microsoft.com/office/drawing/2014/main" id="{3123E8D3-1697-458D-86B3-99B6954E1427}"/>
+                </a:ext>
+              </a:extLst>
+            </p:cNvPr>
+            <p:cNvSpPr txBox="1"/>
+            <p:nvPr/>
+          </p:nvSpPr>
+          <p:spPr>
+            <a:xfrm>
+              <a:off x="5656080" y="4755407"/>
+              <a:ext cx="795731" cy="276999"/>
+            </a:xfrm>
+            <a:prstGeom prst="rect">
+              <a:avLst/>
+            </a:prstGeom>
+            <a:noFill/>
+          </p:spPr>
+          <p:txBody>
+            <a:bodyPr wrap="none" rtlCol="0">
+              <a:spAutoFit/>
+            </a:bodyPr>
+            <a:lstStyle/>
+            <a:p>
+              <a:r>
+                <a:rPr lang="en-US" altLang="ko-KR" sz="1200"/>
+                <a:t>ClusterIP</a:t>
+              </a:r>
+              <a:endParaRPr lang="ko-KR" altLang="en-US" sz="1200"/>
+            </a:p>
+          </p:txBody>
+        </p:sp>
+      </p:grpSp>
+      <p:grpSp>
+        <p:nvGrpSpPr>
+          <p:cNvPr id="4" name="그룹 3">
+            <a:extLst>
+              <a:ext uri="{FF2B5EF4-FFF2-40B4-BE49-F238E27FC236}">
+                <a16:creationId xmlns:a16="http://schemas.microsoft.com/office/drawing/2014/main" id="{56D41BD3-EFB9-4322-8CAC-3F32F32650E4}"/>
+              </a:ext>
+            </a:extLst>
+          </p:cNvPr>
+          <p:cNvGrpSpPr/>
+          <p:nvPr/>
+        </p:nvGrpSpPr>
+        <p:grpSpPr>
+          <a:xfrm>
+            <a:off x="6804248" y="4755407"/>
+            <a:ext cx="1141152" cy="276999"/>
+            <a:chOff x="6447669" y="4755407"/>
+            <a:chExt cx="1141152" cy="276999"/>
+          </a:xfrm>
+        </p:grpSpPr>
+        <p:cxnSp>
+          <p:nvCxnSpPr>
+            <p:cNvPr id="49" name="직선 화살표 연결선 48">
+              <a:extLst>
+                <a:ext uri="{FF2B5EF4-FFF2-40B4-BE49-F238E27FC236}">
+                  <a16:creationId xmlns:a16="http://schemas.microsoft.com/office/drawing/2014/main" id="{5372C781-A21C-47D1-B814-E878D6F31445}"/>
+                </a:ext>
+              </a:extLst>
+            </p:cNvPr>
+            <p:cNvCxnSpPr>
+              <a:cxnSpLocks/>
+            </p:cNvCxnSpPr>
+            <p:nvPr/>
+          </p:nvCxnSpPr>
+          <p:spPr>
+            <a:xfrm>
+              <a:off x="6447669" y="4898028"/>
+              <a:ext cx="284571" cy="0"/>
+            </a:xfrm>
+            <a:prstGeom prst="straightConnector1">
+              <a:avLst/>
+            </a:prstGeom>
+            <a:ln w="28575">
+              <a:solidFill>
+                <a:schemeClr val="accent3">
+                  <a:lumMod val="50000"/>
+                </a:schemeClr>
+              </a:solidFill>
+              <a:tailEnd type="arrow"/>
+            </a:ln>
+          </p:spPr>
+          <p:style>
+            <a:lnRef idx="1">
+              <a:schemeClr val="accent1"/>
+            </a:lnRef>
+            <a:fillRef idx="0">
+              <a:schemeClr val="accent1"/>
+            </a:fillRef>
+            <a:effectRef idx="0">
+              <a:schemeClr val="accent1"/>
+            </a:effectRef>
+            <a:fontRef idx="minor">
+              <a:schemeClr val="tx1"/>
+            </a:fontRef>
+          </p:style>
+        </p:cxnSp>
+        <p:sp>
+          <p:nvSpPr>
+            <p:cNvPr id="50" name="TextBox 49">
+              <a:extLst>
+                <a:ext uri="{FF2B5EF4-FFF2-40B4-BE49-F238E27FC236}">
+                  <a16:creationId xmlns:a16="http://schemas.microsoft.com/office/drawing/2014/main" id="{2B44519B-76A4-486B-B55B-9E5BAE549771}"/>
+                </a:ext>
+              </a:extLst>
+            </p:cNvPr>
+            <p:cNvSpPr txBox="1"/>
+            <p:nvPr/>
+          </p:nvSpPr>
+          <p:spPr>
+            <a:xfrm>
+              <a:off x="6732240" y="4755407"/>
+              <a:ext cx="856581" cy="276999"/>
+            </a:xfrm>
+            <a:prstGeom prst="rect">
+              <a:avLst/>
+            </a:prstGeom>
+            <a:noFill/>
+          </p:spPr>
+          <p:txBody>
+            <a:bodyPr wrap="none" rtlCol="0">
+              <a:spAutoFit/>
+            </a:bodyPr>
+            <a:lstStyle/>
+            <a:p>
+              <a:r>
+                <a:rPr lang="en-US" altLang="ko-KR" sz="1200"/>
+                <a:t>NodePort</a:t>
+              </a:r>
+              <a:endParaRPr lang="ko-KR" altLang="en-US" sz="1200"/>
+            </a:p>
+          </p:txBody>
+        </p:sp>
+      </p:grpSp>
     </p:spTree>
     <p:extLst>
       <p:ext uri="{BB962C8B-B14F-4D97-AF65-F5344CB8AC3E}">
@@ -9518,6 +9725,2797 @@
         </p:nvSpPr>
         <p:spPr>
           <a:xfrm>
+            <a:off x="457200" y="-596602"/>
+            <a:ext cx="8229600" cy="857250"/>
+          </a:xfrm>
+        </p:spPr>
+        <p:txBody>
+          <a:bodyPr/>
+          <a:lstStyle/>
+          <a:p>
+            <a:r>
+              <a:rPr lang="en-US" altLang="ko-KR"/>
+              <a:t>Userspace</a:t>
+            </a:r>
+            <a:r>
+              <a:rPr lang="ko-KR" altLang="en-US"/>
+              <a:t> </a:t>
+            </a:r>
+            <a:r>
+              <a:rPr lang="en-US" altLang="ko-KR"/>
+              <a:t>Mode</a:t>
+            </a:r>
+            <a:r>
+              <a:rPr lang="ko-KR" altLang="en-US"/>
+              <a:t> </a:t>
+            </a:r>
+            <a:r>
+              <a:rPr lang="en-US" altLang="ko-KR"/>
+              <a:t>Packet</a:t>
+            </a:r>
+            <a:r>
+              <a:rPr lang="ko-KR" altLang="en-US"/>
+              <a:t> </a:t>
+            </a:r>
+            <a:r>
+              <a:rPr lang="en-US" altLang="ko-KR"/>
+              <a:t>Path</a:t>
+            </a:r>
+            <a:endParaRPr lang="ko-KR" altLang="en-US"/>
+          </a:p>
+        </p:txBody>
+      </p:sp>
+      <p:sp>
+        <p:nvSpPr>
+          <p:cNvPr id="37" name="사각형: 둥근 모서리 36">
+            <a:extLst>
+              <a:ext uri="{FF2B5EF4-FFF2-40B4-BE49-F238E27FC236}">
+                <a16:creationId xmlns:a16="http://schemas.microsoft.com/office/drawing/2014/main" id="{5DF08894-10CA-4E97-A9A5-E3D93AA9539D}"/>
+              </a:ext>
+            </a:extLst>
+          </p:cNvPr>
+          <p:cNvSpPr/>
+          <p:nvPr/>
+        </p:nvSpPr>
+        <p:spPr>
+          <a:xfrm>
+            <a:off x="1691682" y="267494"/>
+            <a:ext cx="1656182" cy="857250"/>
+          </a:xfrm>
+          <a:prstGeom prst="roundRect">
+            <a:avLst>
+              <a:gd name="adj" fmla="val 6633"/>
+            </a:avLst>
+          </a:prstGeom>
+        </p:spPr>
+        <p:style>
+          <a:lnRef idx="2">
+            <a:schemeClr val="dk1"/>
+          </a:lnRef>
+          <a:fillRef idx="1">
+            <a:schemeClr val="lt1"/>
+          </a:fillRef>
+          <a:effectRef idx="0">
+            <a:schemeClr val="dk1"/>
+          </a:effectRef>
+          <a:fontRef idx="minor">
+            <a:schemeClr val="dk1"/>
+          </a:fontRef>
+        </p:style>
+        <p:txBody>
+          <a:bodyPr rtlCol="0" anchor="t"/>
+          <a:lstStyle/>
+          <a:p>
+            <a:pPr algn="ctr"/>
+            <a:r>
+              <a:rPr lang="en-US" altLang="ko-KR" sz="1400"/>
+              <a:t>Pod A</a:t>
+            </a:r>
+          </a:p>
+          <a:p>
+            <a:pPr algn="ctr"/>
+            <a:r>
+              <a:rPr lang="en-US" altLang="ko-KR" sz="1400"/>
+              <a:t>Net Namespace</a:t>
+            </a:r>
+            <a:endParaRPr lang="ko-KR" altLang="en-US" sz="1400"/>
+          </a:p>
+        </p:txBody>
+      </p:sp>
+      <p:sp>
+        <p:nvSpPr>
+          <p:cNvPr id="40" name="사각형: 둥근 모서리 39">
+            <a:extLst>
+              <a:ext uri="{FF2B5EF4-FFF2-40B4-BE49-F238E27FC236}">
+                <a16:creationId xmlns:a16="http://schemas.microsoft.com/office/drawing/2014/main" id="{BB64BC4F-046B-4833-94B3-D1F2D50843E5}"/>
+              </a:ext>
+            </a:extLst>
+          </p:cNvPr>
+          <p:cNvSpPr/>
+          <p:nvPr/>
+        </p:nvSpPr>
+        <p:spPr>
+          <a:xfrm>
+            <a:off x="1907706" y="852166"/>
+            <a:ext cx="1224134" cy="272578"/>
+          </a:xfrm>
+          <a:prstGeom prst="roundRect">
+            <a:avLst>
+              <a:gd name="adj" fmla="val 15087"/>
+            </a:avLst>
+          </a:prstGeom>
+        </p:spPr>
+        <p:style>
+          <a:lnRef idx="2">
+            <a:schemeClr val="dk1"/>
+          </a:lnRef>
+          <a:fillRef idx="1">
+            <a:schemeClr val="lt1"/>
+          </a:fillRef>
+          <a:effectRef idx="0">
+            <a:schemeClr val="dk1"/>
+          </a:effectRef>
+          <a:fontRef idx="minor">
+            <a:schemeClr val="dk1"/>
+          </a:fontRef>
+        </p:style>
+        <p:txBody>
+          <a:bodyPr rtlCol="0" anchor="ctr"/>
+          <a:lstStyle/>
+          <a:p>
+            <a:pPr algn="ctr"/>
+            <a:r>
+              <a:rPr lang="en-US" altLang="ko-KR" sz="1200"/>
+              <a:t>veth interface</a:t>
+            </a:r>
+          </a:p>
+        </p:txBody>
+      </p:sp>
+      <p:sp>
+        <p:nvSpPr>
+          <p:cNvPr id="42" name="사각형: 둥근 모서리 41">
+            <a:extLst>
+              <a:ext uri="{FF2B5EF4-FFF2-40B4-BE49-F238E27FC236}">
+                <a16:creationId xmlns:a16="http://schemas.microsoft.com/office/drawing/2014/main" id="{C578B6D8-62A4-4C86-A3C2-50037AA64487}"/>
+              </a:ext>
+            </a:extLst>
+          </p:cNvPr>
+          <p:cNvSpPr/>
+          <p:nvPr/>
+        </p:nvSpPr>
+        <p:spPr>
+          <a:xfrm>
+            <a:off x="1216139" y="1309335"/>
+            <a:ext cx="7028266" cy="3111949"/>
+          </a:xfrm>
+          <a:prstGeom prst="roundRect">
+            <a:avLst>
+              <a:gd name="adj" fmla="val 3729"/>
+            </a:avLst>
+          </a:prstGeom>
+        </p:spPr>
+        <p:style>
+          <a:lnRef idx="2">
+            <a:schemeClr val="dk1"/>
+          </a:lnRef>
+          <a:fillRef idx="1">
+            <a:schemeClr val="lt1"/>
+          </a:fillRef>
+          <a:effectRef idx="0">
+            <a:schemeClr val="dk1"/>
+          </a:effectRef>
+          <a:fontRef idx="minor">
+            <a:schemeClr val="dk1"/>
+          </a:fontRef>
+        </p:style>
+        <p:txBody>
+          <a:bodyPr rtlCol="0" anchor="t"/>
+          <a:lstStyle/>
+          <a:p>
+            <a:pPr algn="ctr"/>
+            <a:r>
+              <a:rPr lang="en-US" altLang="ko-KR" sz="1400"/>
+              <a:t>Host Net Namespace</a:t>
+            </a:r>
+            <a:endParaRPr lang="ko-KR" altLang="en-US" sz="1400"/>
+          </a:p>
+        </p:txBody>
+      </p:sp>
+      <p:sp>
+        <p:nvSpPr>
+          <p:cNvPr id="43" name="사각형: 둥근 모서리 42">
+            <a:extLst>
+              <a:ext uri="{FF2B5EF4-FFF2-40B4-BE49-F238E27FC236}">
+                <a16:creationId xmlns:a16="http://schemas.microsoft.com/office/drawing/2014/main" id="{9E1EF096-9201-4CF2-9016-878474AC7960}"/>
+              </a:ext>
+            </a:extLst>
+          </p:cNvPr>
+          <p:cNvSpPr/>
+          <p:nvPr/>
+        </p:nvSpPr>
+        <p:spPr>
+          <a:xfrm>
+            <a:off x="1907706" y="1309927"/>
+            <a:ext cx="1224134" cy="272578"/>
+          </a:xfrm>
+          <a:prstGeom prst="roundRect">
+            <a:avLst>
+              <a:gd name="adj" fmla="val 15087"/>
+            </a:avLst>
+          </a:prstGeom>
+        </p:spPr>
+        <p:style>
+          <a:lnRef idx="2">
+            <a:schemeClr val="dk1"/>
+          </a:lnRef>
+          <a:fillRef idx="1">
+            <a:schemeClr val="lt1"/>
+          </a:fillRef>
+          <a:effectRef idx="0">
+            <a:schemeClr val="dk1"/>
+          </a:effectRef>
+          <a:fontRef idx="minor">
+            <a:schemeClr val="dk1"/>
+          </a:fontRef>
+        </p:style>
+        <p:txBody>
+          <a:bodyPr rtlCol="0" anchor="ctr"/>
+          <a:lstStyle/>
+          <a:p>
+            <a:pPr algn="ctr"/>
+            <a:r>
+              <a:rPr lang="en-US" altLang="ko-KR" sz="1200"/>
+              <a:t>veth interface</a:t>
+            </a:r>
+          </a:p>
+        </p:txBody>
+      </p:sp>
+      <p:cxnSp>
+        <p:nvCxnSpPr>
+          <p:cNvPr id="45" name="직선 연결선 44">
+            <a:extLst>
+              <a:ext uri="{FF2B5EF4-FFF2-40B4-BE49-F238E27FC236}">
+                <a16:creationId xmlns:a16="http://schemas.microsoft.com/office/drawing/2014/main" id="{596DEBC7-DF1F-4F4B-9E15-E411A679E8A0}"/>
+              </a:ext>
+            </a:extLst>
+          </p:cNvPr>
+          <p:cNvCxnSpPr>
+            <a:cxnSpLocks/>
+            <a:stCxn id="40" idx="2"/>
+            <a:endCxn id="43" idx="0"/>
+          </p:cNvCxnSpPr>
+          <p:nvPr/>
+        </p:nvCxnSpPr>
+        <p:spPr>
+          <a:xfrm>
+            <a:off x="2519773" y="1124744"/>
+            <a:ext cx="0" cy="185183"/>
+          </a:xfrm>
+          <a:prstGeom prst="line">
+            <a:avLst/>
+          </a:prstGeom>
+          <a:ln w="28575">
+            <a:solidFill>
+              <a:schemeClr val="tx1"/>
+            </a:solidFill>
+          </a:ln>
+        </p:spPr>
+        <p:style>
+          <a:lnRef idx="1">
+            <a:schemeClr val="accent1"/>
+          </a:lnRef>
+          <a:fillRef idx="0">
+            <a:schemeClr val="accent1"/>
+          </a:fillRef>
+          <a:effectRef idx="0">
+            <a:schemeClr val="accent1"/>
+          </a:effectRef>
+          <a:fontRef idx="minor">
+            <a:schemeClr val="tx1"/>
+          </a:fontRef>
+        </p:style>
+      </p:cxnSp>
+      <p:sp>
+        <p:nvSpPr>
+          <p:cNvPr id="78" name="사각형: 둥근 모서리 77">
+            <a:extLst>
+              <a:ext uri="{FF2B5EF4-FFF2-40B4-BE49-F238E27FC236}">
+                <a16:creationId xmlns:a16="http://schemas.microsoft.com/office/drawing/2014/main" id="{8C1B9B8D-0CF6-4E54-8D89-CB269563C2F2}"/>
+              </a:ext>
+            </a:extLst>
+          </p:cNvPr>
+          <p:cNvSpPr/>
+          <p:nvPr/>
+        </p:nvSpPr>
+        <p:spPr>
+          <a:xfrm>
+            <a:off x="6012160" y="267494"/>
+            <a:ext cx="1656182" cy="857250"/>
+          </a:xfrm>
+          <a:prstGeom prst="roundRect">
+            <a:avLst>
+              <a:gd name="adj" fmla="val 6633"/>
+            </a:avLst>
+          </a:prstGeom>
+        </p:spPr>
+        <p:style>
+          <a:lnRef idx="2">
+            <a:schemeClr val="dk1"/>
+          </a:lnRef>
+          <a:fillRef idx="1">
+            <a:schemeClr val="lt1"/>
+          </a:fillRef>
+          <a:effectRef idx="0">
+            <a:schemeClr val="dk1"/>
+          </a:effectRef>
+          <a:fontRef idx="minor">
+            <a:schemeClr val="dk1"/>
+          </a:fontRef>
+        </p:style>
+        <p:txBody>
+          <a:bodyPr rtlCol="0" anchor="t"/>
+          <a:lstStyle/>
+          <a:p>
+            <a:pPr algn="ctr"/>
+            <a:r>
+              <a:rPr lang="en-US" altLang="ko-KR" sz="1400"/>
+              <a:t>Pod B</a:t>
+            </a:r>
+          </a:p>
+          <a:p>
+            <a:pPr algn="ctr"/>
+            <a:r>
+              <a:rPr lang="en-US" altLang="ko-KR" sz="1400"/>
+              <a:t>Net Namespace</a:t>
+            </a:r>
+            <a:endParaRPr lang="ko-KR" altLang="en-US" sz="1400"/>
+          </a:p>
+        </p:txBody>
+      </p:sp>
+      <p:sp>
+        <p:nvSpPr>
+          <p:cNvPr id="79" name="사각형: 둥근 모서리 78">
+            <a:extLst>
+              <a:ext uri="{FF2B5EF4-FFF2-40B4-BE49-F238E27FC236}">
+                <a16:creationId xmlns:a16="http://schemas.microsoft.com/office/drawing/2014/main" id="{CED02E20-5817-4B82-B805-8CECA18FA615}"/>
+              </a:ext>
+            </a:extLst>
+          </p:cNvPr>
+          <p:cNvSpPr/>
+          <p:nvPr/>
+        </p:nvSpPr>
+        <p:spPr>
+          <a:xfrm>
+            <a:off x="6228184" y="852166"/>
+            <a:ext cx="1224134" cy="272578"/>
+          </a:xfrm>
+          <a:prstGeom prst="roundRect">
+            <a:avLst>
+              <a:gd name="adj" fmla="val 15087"/>
+            </a:avLst>
+          </a:prstGeom>
+        </p:spPr>
+        <p:style>
+          <a:lnRef idx="2">
+            <a:schemeClr val="dk1"/>
+          </a:lnRef>
+          <a:fillRef idx="1">
+            <a:schemeClr val="lt1"/>
+          </a:fillRef>
+          <a:effectRef idx="0">
+            <a:schemeClr val="dk1"/>
+          </a:effectRef>
+          <a:fontRef idx="minor">
+            <a:schemeClr val="dk1"/>
+          </a:fontRef>
+        </p:style>
+        <p:txBody>
+          <a:bodyPr rtlCol="0" anchor="ctr"/>
+          <a:lstStyle/>
+          <a:p>
+            <a:pPr algn="ctr"/>
+            <a:r>
+              <a:rPr lang="en-US" altLang="ko-KR" sz="1200"/>
+              <a:t>veth interface</a:t>
+            </a:r>
+          </a:p>
+        </p:txBody>
+      </p:sp>
+      <p:sp>
+        <p:nvSpPr>
+          <p:cNvPr id="80" name="사각형: 둥근 모서리 79">
+            <a:extLst>
+              <a:ext uri="{FF2B5EF4-FFF2-40B4-BE49-F238E27FC236}">
+                <a16:creationId xmlns:a16="http://schemas.microsoft.com/office/drawing/2014/main" id="{ABBB7494-F427-41D5-B223-E9B58F163FF2}"/>
+              </a:ext>
+            </a:extLst>
+          </p:cNvPr>
+          <p:cNvSpPr/>
+          <p:nvPr/>
+        </p:nvSpPr>
+        <p:spPr>
+          <a:xfrm>
+            <a:off x="6228184" y="1309927"/>
+            <a:ext cx="1224134" cy="272578"/>
+          </a:xfrm>
+          <a:prstGeom prst="roundRect">
+            <a:avLst>
+              <a:gd name="adj" fmla="val 15087"/>
+            </a:avLst>
+          </a:prstGeom>
+        </p:spPr>
+        <p:style>
+          <a:lnRef idx="2">
+            <a:schemeClr val="dk1"/>
+          </a:lnRef>
+          <a:fillRef idx="1">
+            <a:schemeClr val="lt1"/>
+          </a:fillRef>
+          <a:effectRef idx="0">
+            <a:schemeClr val="dk1"/>
+          </a:effectRef>
+          <a:fontRef idx="minor">
+            <a:schemeClr val="dk1"/>
+          </a:fontRef>
+        </p:style>
+        <p:txBody>
+          <a:bodyPr rtlCol="0" anchor="ctr"/>
+          <a:lstStyle/>
+          <a:p>
+            <a:pPr algn="ctr"/>
+            <a:r>
+              <a:rPr lang="en-US" altLang="ko-KR" sz="1200"/>
+              <a:t>veth interface</a:t>
+            </a:r>
+          </a:p>
+        </p:txBody>
+      </p:sp>
+      <p:cxnSp>
+        <p:nvCxnSpPr>
+          <p:cNvPr id="81" name="직선 연결선 80">
+            <a:extLst>
+              <a:ext uri="{FF2B5EF4-FFF2-40B4-BE49-F238E27FC236}">
+                <a16:creationId xmlns:a16="http://schemas.microsoft.com/office/drawing/2014/main" id="{1CD8A4E0-E791-4C69-8231-0FE7449C79BA}"/>
+              </a:ext>
+            </a:extLst>
+          </p:cNvPr>
+          <p:cNvCxnSpPr>
+            <a:cxnSpLocks/>
+            <a:stCxn id="79" idx="2"/>
+            <a:endCxn id="80" idx="0"/>
+          </p:cNvCxnSpPr>
+          <p:nvPr/>
+        </p:nvCxnSpPr>
+        <p:spPr>
+          <a:xfrm>
+            <a:off x="6840251" y="1124744"/>
+            <a:ext cx="0" cy="185183"/>
+          </a:xfrm>
+          <a:prstGeom prst="line">
+            <a:avLst/>
+          </a:prstGeom>
+          <a:ln w="28575">
+            <a:solidFill>
+              <a:schemeClr val="tx1"/>
+            </a:solidFill>
+          </a:ln>
+        </p:spPr>
+        <p:style>
+          <a:lnRef idx="1">
+            <a:schemeClr val="accent1"/>
+          </a:lnRef>
+          <a:fillRef idx="0">
+            <a:schemeClr val="accent1"/>
+          </a:fillRef>
+          <a:effectRef idx="0">
+            <a:schemeClr val="accent1"/>
+          </a:effectRef>
+          <a:fontRef idx="minor">
+            <a:schemeClr val="tx1"/>
+          </a:fontRef>
+        </p:style>
+      </p:cxnSp>
+      <p:sp>
+        <p:nvSpPr>
+          <p:cNvPr id="85" name="사각형: 둥근 모서리 84">
+            <a:extLst>
+              <a:ext uri="{FF2B5EF4-FFF2-40B4-BE49-F238E27FC236}">
+                <a16:creationId xmlns:a16="http://schemas.microsoft.com/office/drawing/2014/main" id="{70323992-35B6-4AFC-8CA7-B7AE2E0F2849}"/>
+              </a:ext>
+            </a:extLst>
+          </p:cNvPr>
+          <p:cNvSpPr/>
+          <p:nvPr/>
+        </p:nvSpPr>
+        <p:spPr>
+          <a:xfrm>
+            <a:off x="3448382" y="4149079"/>
+            <a:ext cx="2563778" cy="272578"/>
+          </a:xfrm>
+          <a:prstGeom prst="roundRect">
+            <a:avLst>
+              <a:gd name="adj" fmla="val 15087"/>
+            </a:avLst>
+          </a:prstGeom>
+        </p:spPr>
+        <p:style>
+          <a:lnRef idx="2">
+            <a:schemeClr val="dk1"/>
+          </a:lnRef>
+          <a:fillRef idx="1">
+            <a:schemeClr val="lt1"/>
+          </a:fillRef>
+          <a:effectRef idx="0">
+            <a:schemeClr val="dk1"/>
+          </a:effectRef>
+          <a:fontRef idx="minor">
+            <a:schemeClr val="dk1"/>
+          </a:fontRef>
+        </p:style>
+        <p:txBody>
+          <a:bodyPr rtlCol="0" anchor="ctr"/>
+          <a:lstStyle/>
+          <a:p>
+            <a:pPr algn="ctr"/>
+            <a:r>
+              <a:rPr lang="en-US" altLang="ko-KR" sz="1200"/>
+              <a:t>eth / IPIP / VXLAN Interface</a:t>
+            </a:r>
+          </a:p>
+        </p:txBody>
+      </p:sp>
+      <p:sp>
+        <p:nvSpPr>
+          <p:cNvPr id="86" name="사각형: 둥근 모서리 85">
+            <a:extLst>
+              <a:ext uri="{FF2B5EF4-FFF2-40B4-BE49-F238E27FC236}">
+                <a16:creationId xmlns:a16="http://schemas.microsoft.com/office/drawing/2014/main" id="{005ED654-6BEF-41E6-92C9-A8DCE7F19AC0}"/>
+              </a:ext>
+            </a:extLst>
+          </p:cNvPr>
+          <p:cNvSpPr/>
+          <p:nvPr/>
+        </p:nvSpPr>
+        <p:spPr>
+          <a:xfrm>
+            <a:off x="3830855" y="1700807"/>
+            <a:ext cx="1798833" cy="519510"/>
+          </a:xfrm>
+          <a:prstGeom prst="roundRect">
+            <a:avLst>
+              <a:gd name="adj" fmla="val 6633"/>
+            </a:avLst>
+          </a:prstGeom>
+        </p:spPr>
+        <p:style>
+          <a:lnRef idx="2">
+            <a:schemeClr val="dk1"/>
+          </a:lnRef>
+          <a:fillRef idx="1">
+            <a:schemeClr val="lt1"/>
+          </a:fillRef>
+          <a:effectRef idx="0">
+            <a:schemeClr val="dk1"/>
+          </a:effectRef>
+          <a:fontRef idx="minor">
+            <a:schemeClr val="dk1"/>
+          </a:fontRef>
+        </p:style>
+        <p:txBody>
+          <a:bodyPr rtlCol="0" anchor="ctr"/>
+          <a:lstStyle/>
+          <a:p>
+            <a:pPr algn="ctr"/>
+            <a:r>
+              <a:rPr lang="en-US" altLang="ko-KR" sz="1200"/>
+              <a:t>Host / Pod Process</a:t>
+            </a:r>
+          </a:p>
+          <a:p>
+            <a:pPr algn="ctr"/>
+            <a:r>
+              <a:rPr lang="en-US" altLang="ko-KR" sz="1200" b="1">
+                <a:solidFill>
+                  <a:schemeClr val="tx1"/>
+                </a:solidFill>
+              </a:rPr>
+              <a:t>(kube-proxy)</a:t>
+            </a:r>
+            <a:endParaRPr lang="ko-KR" altLang="en-US" sz="1200" b="1">
+              <a:solidFill>
+                <a:schemeClr val="tx1"/>
+              </a:solidFill>
+            </a:endParaRPr>
+          </a:p>
+        </p:txBody>
+      </p:sp>
+      <p:sp>
+        <p:nvSpPr>
+          <p:cNvPr id="90" name="사각형: 둥근 모서리 89">
+            <a:extLst>
+              <a:ext uri="{FF2B5EF4-FFF2-40B4-BE49-F238E27FC236}">
+                <a16:creationId xmlns:a16="http://schemas.microsoft.com/office/drawing/2014/main" id="{3083D0A7-8723-4979-9671-4E9677E30557}"/>
+              </a:ext>
+            </a:extLst>
+          </p:cNvPr>
+          <p:cNvSpPr/>
+          <p:nvPr/>
+        </p:nvSpPr>
+        <p:spPr>
+          <a:xfrm>
+            <a:off x="1621039" y="1828040"/>
+            <a:ext cx="1797468" cy="272578"/>
+          </a:xfrm>
+          <a:prstGeom prst="roundRect">
+            <a:avLst>
+              <a:gd name="adj" fmla="val 15087"/>
+            </a:avLst>
+          </a:prstGeom>
+          <a:ln>
+            <a:solidFill>
+              <a:schemeClr val="tx2"/>
+            </a:solidFill>
+          </a:ln>
+        </p:spPr>
+        <p:style>
+          <a:lnRef idx="2">
+            <a:schemeClr val="dk1"/>
+          </a:lnRef>
+          <a:fillRef idx="1">
+            <a:schemeClr val="lt1"/>
+          </a:fillRef>
+          <a:effectRef idx="0">
+            <a:schemeClr val="dk1"/>
+          </a:effectRef>
+          <a:fontRef idx="minor">
+            <a:schemeClr val="dk1"/>
+          </a:fontRef>
+        </p:style>
+        <p:txBody>
+          <a:bodyPr rtlCol="0" anchor="ctr"/>
+          <a:lstStyle/>
+          <a:p>
+            <a:pPr algn="ctr"/>
+            <a:r>
+              <a:rPr lang="en-US" altLang="ko-KR" sz="1200">
+                <a:solidFill>
+                  <a:schemeClr val="tx2"/>
+                </a:solidFill>
+              </a:rPr>
+              <a:t>PREROUTING</a:t>
+            </a:r>
+          </a:p>
+        </p:txBody>
+      </p:sp>
+      <p:sp>
+        <p:nvSpPr>
+          <p:cNvPr id="91" name="사각형: 둥근 모서리 90">
+            <a:extLst>
+              <a:ext uri="{FF2B5EF4-FFF2-40B4-BE49-F238E27FC236}">
+                <a16:creationId xmlns:a16="http://schemas.microsoft.com/office/drawing/2014/main" id="{8673B26D-82CE-4191-92D3-8B4D0EEE3E55}"/>
+              </a:ext>
+            </a:extLst>
+          </p:cNvPr>
+          <p:cNvSpPr/>
+          <p:nvPr/>
+        </p:nvSpPr>
+        <p:spPr>
+          <a:xfrm>
+            <a:off x="3831537" y="2432942"/>
+            <a:ext cx="1797468" cy="272578"/>
+          </a:xfrm>
+          <a:prstGeom prst="roundRect">
+            <a:avLst>
+              <a:gd name="adj" fmla="val 15087"/>
+            </a:avLst>
+          </a:prstGeom>
+          <a:ln>
+            <a:solidFill>
+              <a:schemeClr val="tx2"/>
+            </a:solidFill>
+          </a:ln>
+        </p:spPr>
+        <p:style>
+          <a:lnRef idx="2">
+            <a:schemeClr val="dk1"/>
+          </a:lnRef>
+          <a:fillRef idx="1">
+            <a:schemeClr val="lt1"/>
+          </a:fillRef>
+          <a:effectRef idx="0">
+            <a:schemeClr val="dk1"/>
+          </a:effectRef>
+          <a:fontRef idx="minor">
+            <a:schemeClr val="dk1"/>
+          </a:fontRef>
+        </p:style>
+        <p:txBody>
+          <a:bodyPr rtlCol="0" anchor="ctr"/>
+          <a:lstStyle/>
+          <a:p>
+            <a:pPr algn="ctr"/>
+            <a:r>
+              <a:rPr lang="en-US" altLang="ko-KR" sz="1200">
+                <a:solidFill>
+                  <a:schemeClr val="tx2"/>
+                </a:solidFill>
+              </a:rPr>
+              <a:t>OUTPUT</a:t>
+            </a:r>
+          </a:p>
+        </p:txBody>
+      </p:sp>
+      <p:cxnSp>
+        <p:nvCxnSpPr>
+          <p:cNvPr id="93" name="직선 화살표 연결선 92">
+            <a:extLst>
+              <a:ext uri="{FF2B5EF4-FFF2-40B4-BE49-F238E27FC236}">
+                <a16:creationId xmlns:a16="http://schemas.microsoft.com/office/drawing/2014/main" id="{2511C344-2234-4CC1-8C01-CC5A002274E0}"/>
+              </a:ext>
+            </a:extLst>
+          </p:cNvPr>
+          <p:cNvCxnSpPr>
+            <a:cxnSpLocks/>
+            <a:stCxn id="43" idx="2"/>
+            <a:endCxn id="90" idx="0"/>
+          </p:cNvCxnSpPr>
+          <p:nvPr/>
+        </p:nvCxnSpPr>
+        <p:spPr>
+          <a:xfrm>
+            <a:off x="2519773" y="1582505"/>
+            <a:ext cx="0" cy="245535"/>
+          </a:xfrm>
+          <a:prstGeom prst="straightConnector1">
+            <a:avLst/>
+          </a:prstGeom>
+          <a:ln w="28575">
+            <a:solidFill>
+              <a:schemeClr val="tx1"/>
+            </a:solidFill>
+            <a:tailEnd type="arrow"/>
+          </a:ln>
+        </p:spPr>
+        <p:style>
+          <a:lnRef idx="1">
+            <a:schemeClr val="accent1"/>
+          </a:lnRef>
+          <a:fillRef idx="0">
+            <a:schemeClr val="accent1"/>
+          </a:fillRef>
+          <a:effectRef idx="0">
+            <a:schemeClr val="accent1"/>
+          </a:effectRef>
+          <a:fontRef idx="minor">
+            <a:schemeClr val="tx1"/>
+          </a:fontRef>
+        </p:style>
+      </p:cxnSp>
+      <p:cxnSp>
+        <p:nvCxnSpPr>
+          <p:cNvPr id="96" name="직선 화살표 연결선 95">
+            <a:extLst>
+              <a:ext uri="{FF2B5EF4-FFF2-40B4-BE49-F238E27FC236}">
+                <a16:creationId xmlns:a16="http://schemas.microsoft.com/office/drawing/2014/main" id="{F6B53178-8C8D-4A71-992D-DEB3A83586B3}"/>
+              </a:ext>
+            </a:extLst>
+          </p:cNvPr>
+          <p:cNvCxnSpPr>
+            <a:cxnSpLocks/>
+          </p:cNvCxnSpPr>
+          <p:nvPr/>
+        </p:nvCxnSpPr>
+        <p:spPr>
+          <a:xfrm flipH="1">
+            <a:off x="4644008" y="2220317"/>
+            <a:ext cx="1" cy="212625"/>
+          </a:xfrm>
+          <a:prstGeom prst="straightConnector1">
+            <a:avLst/>
+          </a:prstGeom>
+          <a:ln w="28575">
+            <a:solidFill>
+              <a:schemeClr val="tx1"/>
+            </a:solidFill>
+            <a:tailEnd type="arrow"/>
+          </a:ln>
+        </p:spPr>
+        <p:style>
+          <a:lnRef idx="1">
+            <a:schemeClr val="accent1"/>
+          </a:lnRef>
+          <a:fillRef idx="0">
+            <a:schemeClr val="accent1"/>
+          </a:fillRef>
+          <a:effectRef idx="0">
+            <a:schemeClr val="accent1"/>
+          </a:effectRef>
+          <a:fontRef idx="minor">
+            <a:schemeClr val="tx1"/>
+          </a:fontRef>
+        </p:style>
+      </p:cxnSp>
+      <p:cxnSp>
+        <p:nvCxnSpPr>
+          <p:cNvPr id="102" name="직선 화살표 연결선 101">
+            <a:extLst>
+              <a:ext uri="{FF2B5EF4-FFF2-40B4-BE49-F238E27FC236}">
+                <a16:creationId xmlns:a16="http://schemas.microsoft.com/office/drawing/2014/main" id="{ECEE0818-1A81-4312-9F3D-8C1349A7D83E}"/>
+              </a:ext>
+            </a:extLst>
+          </p:cNvPr>
+          <p:cNvCxnSpPr>
+            <a:cxnSpLocks/>
+            <a:stCxn id="90" idx="2"/>
+            <a:endCxn id="41" idx="0"/>
+          </p:cNvCxnSpPr>
+          <p:nvPr/>
+        </p:nvCxnSpPr>
+        <p:spPr>
+          <a:xfrm>
+            <a:off x="2519773" y="2100618"/>
+            <a:ext cx="0" cy="269179"/>
+          </a:xfrm>
+          <a:prstGeom prst="straightConnector1">
+            <a:avLst/>
+          </a:prstGeom>
+          <a:ln w="28575">
+            <a:solidFill>
+              <a:srgbClr val="C00000"/>
+            </a:solidFill>
+            <a:tailEnd type="arrow"/>
+          </a:ln>
+        </p:spPr>
+        <p:style>
+          <a:lnRef idx="1">
+            <a:schemeClr val="accent1"/>
+          </a:lnRef>
+          <a:fillRef idx="0">
+            <a:schemeClr val="accent1"/>
+          </a:fillRef>
+          <a:effectRef idx="0">
+            <a:schemeClr val="accent1"/>
+          </a:effectRef>
+          <a:fontRef idx="minor">
+            <a:schemeClr val="tx1"/>
+          </a:fontRef>
+        </p:style>
+      </p:cxnSp>
+      <p:sp>
+        <p:nvSpPr>
+          <p:cNvPr id="41" name="사각형: 둥근 모서리 40">
+            <a:extLst>
+              <a:ext uri="{FF2B5EF4-FFF2-40B4-BE49-F238E27FC236}">
+                <a16:creationId xmlns:a16="http://schemas.microsoft.com/office/drawing/2014/main" id="{39558EA9-7CDE-4AF4-AF12-452E1B805636}"/>
+              </a:ext>
+            </a:extLst>
+          </p:cNvPr>
+          <p:cNvSpPr/>
+          <p:nvPr/>
+        </p:nvSpPr>
+        <p:spPr>
+          <a:xfrm>
+            <a:off x="1621039" y="2369797"/>
+            <a:ext cx="1797468" cy="398868"/>
+          </a:xfrm>
+          <a:prstGeom prst="roundRect">
+            <a:avLst>
+              <a:gd name="adj" fmla="val 15087"/>
+            </a:avLst>
+          </a:prstGeom>
+          <a:ln>
+            <a:solidFill>
+              <a:schemeClr val="tx2"/>
+            </a:solidFill>
+          </a:ln>
+        </p:spPr>
+        <p:style>
+          <a:lnRef idx="2">
+            <a:schemeClr val="dk1"/>
+          </a:lnRef>
+          <a:fillRef idx="1">
+            <a:schemeClr val="lt1"/>
+          </a:fillRef>
+          <a:effectRef idx="0">
+            <a:schemeClr val="dk1"/>
+          </a:effectRef>
+          <a:fontRef idx="minor">
+            <a:schemeClr val="dk1"/>
+          </a:fontRef>
+        </p:style>
+        <p:txBody>
+          <a:bodyPr rtlCol="0" anchor="ctr"/>
+          <a:lstStyle/>
+          <a:p>
+            <a:pPr algn="ctr"/>
+            <a:r>
+              <a:rPr lang="en-US" altLang="ko-KR" sz="1200" b="1">
+                <a:solidFill>
+                  <a:schemeClr val="tx2"/>
+                </a:solidFill>
+              </a:rPr>
+              <a:t>KUBE-PORTALS-CONTAINER</a:t>
+            </a:r>
+            <a:endParaRPr lang="ko-KR" altLang="en-US" sz="1200" b="1">
+              <a:solidFill>
+                <a:schemeClr val="tx2"/>
+              </a:solidFill>
+            </a:endParaRPr>
+          </a:p>
+        </p:txBody>
+      </p:sp>
+      <p:sp>
+        <p:nvSpPr>
+          <p:cNvPr id="44" name="사각형: 둥근 모서리 43">
+            <a:extLst>
+              <a:ext uri="{FF2B5EF4-FFF2-40B4-BE49-F238E27FC236}">
+                <a16:creationId xmlns:a16="http://schemas.microsoft.com/office/drawing/2014/main" id="{6B68C29B-E4E1-4388-B1B3-23784F4A1546}"/>
+              </a:ext>
+            </a:extLst>
+          </p:cNvPr>
+          <p:cNvSpPr/>
+          <p:nvPr/>
+        </p:nvSpPr>
+        <p:spPr>
+          <a:xfrm>
+            <a:off x="1621039" y="2984862"/>
+            <a:ext cx="1797468" cy="398868"/>
+          </a:xfrm>
+          <a:prstGeom prst="roundRect">
+            <a:avLst>
+              <a:gd name="adj" fmla="val 15087"/>
+            </a:avLst>
+          </a:prstGeom>
+          <a:ln>
+            <a:solidFill>
+              <a:schemeClr val="tx2"/>
+            </a:solidFill>
+          </a:ln>
+        </p:spPr>
+        <p:style>
+          <a:lnRef idx="2">
+            <a:schemeClr val="dk1"/>
+          </a:lnRef>
+          <a:fillRef idx="1">
+            <a:schemeClr val="lt1"/>
+          </a:fillRef>
+          <a:effectRef idx="0">
+            <a:schemeClr val="dk1"/>
+          </a:effectRef>
+          <a:fontRef idx="minor">
+            <a:schemeClr val="dk1"/>
+          </a:fontRef>
+        </p:style>
+        <p:txBody>
+          <a:bodyPr rtlCol="0" anchor="ctr"/>
+          <a:lstStyle/>
+          <a:p>
+            <a:pPr algn="ctr"/>
+            <a:r>
+              <a:rPr lang="en-US" altLang="ko-KR" sz="1200" b="1">
+                <a:solidFill>
+                  <a:schemeClr val="tx2"/>
+                </a:solidFill>
+              </a:rPr>
+              <a:t>KUBE-NODEPORT-CONTAINER</a:t>
+            </a:r>
+            <a:endParaRPr lang="ko-KR" altLang="en-US" sz="1200" b="1">
+              <a:solidFill>
+                <a:schemeClr val="tx2"/>
+              </a:solidFill>
+            </a:endParaRPr>
+          </a:p>
+        </p:txBody>
+      </p:sp>
+      <p:sp>
+        <p:nvSpPr>
+          <p:cNvPr id="51" name="사각형: 둥근 모서리 50">
+            <a:extLst>
+              <a:ext uri="{FF2B5EF4-FFF2-40B4-BE49-F238E27FC236}">
+                <a16:creationId xmlns:a16="http://schemas.microsoft.com/office/drawing/2014/main" id="{D22F7C81-807A-4E98-8C89-1FBCE4CFBDEB}"/>
+              </a:ext>
+            </a:extLst>
+          </p:cNvPr>
+          <p:cNvSpPr/>
+          <p:nvPr/>
+        </p:nvSpPr>
+        <p:spPr>
+          <a:xfrm>
+            <a:off x="5941517" y="2369797"/>
+            <a:ext cx="1797468" cy="398868"/>
+          </a:xfrm>
+          <a:prstGeom prst="roundRect">
+            <a:avLst>
+              <a:gd name="adj" fmla="val 15087"/>
+            </a:avLst>
+          </a:prstGeom>
+          <a:ln>
+            <a:solidFill>
+              <a:schemeClr val="tx2"/>
+            </a:solidFill>
+          </a:ln>
+        </p:spPr>
+        <p:style>
+          <a:lnRef idx="2">
+            <a:schemeClr val="dk1"/>
+          </a:lnRef>
+          <a:fillRef idx="1">
+            <a:schemeClr val="lt1"/>
+          </a:fillRef>
+          <a:effectRef idx="0">
+            <a:schemeClr val="dk1"/>
+          </a:effectRef>
+          <a:fontRef idx="minor">
+            <a:schemeClr val="dk1"/>
+          </a:fontRef>
+        </p:style>
+        <p:txBody>
+          <a:bodyPr rtlCol="0" anchor="ctr"/>
+          <a:lstStyle/>
+          <a:p>
+            <a:pPr algn="ctr"/>
+            <a:r>
+              <a:rPr lang="en-US" altLang="ko-KR" sz="1200" b="1">
+                <a:solidFill>
+                  <a:schemeClr val="tx2"/>
+                </a:solidFill>
+              </a:rPr>
+              <a:t>KUBE-PORTALS-HOST</a:t>
+            </a:r>
+            <a:endParaRPr lang="ko-KR" altLang="en-US" sz="1200" b="1">
+              <a:solidFill>
+                <a:schemeClr val="tx2"/>
+              </a:solidFill>
+            </a:endParaRPr>
+          </a:p>
+        </p:txBody>
+      </p:sp>
+      <p:sp>
+        <p:nvSpPr>
+          <p:cNvPr id="52" name="사각형: 둥근 모서리 51">
+            <a:extLst>
+              <a:ext uri="{FF2B5EF4-FFF2-40B4-BE49-F238E27FC236}">
+                <a16:creationId xmlns:a16="http://schemas.microsoft.com/office/drawing/2014/main" id="{0FBEC764-8F47-47BE-876A-19987772F5AF}"/>
+              </a:ext>
+            </a:extLst>
+          </p:cNvPr>
+          <p:cNvSpPr/>
+          <p:nvPr/>
+        </p:nvSpPr>
+        <p:spPr>
+          <a:xfrm>
+            <a:off x="5941517" y="2984862"/>
+            <a:ext cx="1797468" cy="398868"/>
+          </a:xfrm>
+          <a:prstGeom prst="roundRect">
+            <a:avLst>
+              <a:gd name="adj" fmla="val 15087"/>
+            </a:avLst>
+          </a:prstGeom>
+          <a:ln>
+            <a:solidFill>
+              <a:schemeClr val="tx2"/>
+            </a:solidFill>
+          </a:ln>
+        </p:spPr>
+        <p:style>
+          <a:lnRef idx="2">
+            <a:schemeClr val="dk1"/>
+          </a:lnRef>
+          <a:fillRef idx="1">
+            <a:schemeClr val="lt1"/>
+          </a:fillRef>
+          <a:effectRef idx="0">
+            <a:schemeClr val="dk1"/>
+          </a:effectRef>
+          <a:fontRef idx="minor">
+            <a:schemeClr val="dk1"/>
+          </a:fontRef>
+        </p:style>
+        <p:txBody>
+          <a:bodyPr rtlCol="0" anchor="ctr"/>
+          <a:lstStyle/>
+          <a:p>
+            <a:pPr algn="ctr"/>
+            <a:r>
+              <a:rPr lang="en-US" altLang="ko-KR" sz="1200" b="1">
+                <a:solidFill>
+                  <a:schemeClr val="tx2"/>
+                </a:solidFill>
+              </a:rPr>
+              <a:t>KUBE-NODEPORT-HOST</a:t>
+            </a:r>
+            <a:endParaRPr lang="ko-KR" altLang="en-US" sz="1200" b="1">
+              <a:solidFill>
+                <a:schemeClr val="tx2"/>
+              </a:solidFill>
+            </a:endParaRPr>
+          </a:p>
+        </p:txBody>
+      </p:sp>
+      <p:cxnSp>
+        <p:nvCxnSpPr>
+          <p:cNvPr id="56" name="직선 화살표 연결선 55">
+            <a:extLst>
+              <a:ext uri="{FF2B5EF4-FFF2-40B4-BE49-F238E27FC236}">
+                <a16:creationId xmlns:a16="http://schemas.microsoft.com/office/drawing/2014/main" id="{126C014A-0EF3-42F3-8408-0592C1499E19}"/>
+              </a:ext>
+            </a:extLst>
+          </p:cNvPr>
+          <p:cNvCxnSpPr>
+            <a:cxnSpLocks/>
+            <a:stCxn id="91" idx="3"/>
+            <a:endCxn id="52" idx="0"/>
+          </p:cNvCxnSpPr>
+          <p:nvPr/>
+        </p:nvCxnSpPr>
+        <p:spPr>
+          <a:xfrm>
+            <a:off x="5629005" y="2569231"/>
+            <a:ext cx="1211246" cy="415631"/>
+          </a:xfrm>
+          <a:prstGeom prst="straightConnector1">
+            <a:avLst/>
+          </a:prstGeom>
+          <a:ln w="28575">
+            <a:solidFill>
+              <a:schemeClr val="accent3">
+                <a:lumMod val="50000"/>
+              </a:schemeClr>
+            </a:solidFill>
+            <a:tailEnd type="arrow"/>
+          </a:ln>
+        </p:spPr>
+        <p:style>
+          <a:lnRef idx="1">
+            <a:schemeClr val="accent1"/>
+          </a:lnRef>
+          <a:fillRef idx="0">
+            <a:schemeClr val="accent1"/>
+          </a:fillRef>
+          <a:effectRef idx="0">
+            <a:schemeClr val="accent1"/>
+          </a:effectRef>
+          <a:fontRef idx="minor">
+            <a:schemeClr val="tx1"/>
+          </a:fontRef>
+        </p:style>
+      </p:cxnSp>
+      <p:sp>
+        <p:nvSpPr>
+          <p:cNvPr id="59" name="사각형: 둥근 모서리 58">
+            <a:extLst>
+              <a:ext uri="{FF2B5EF4-FFF2-40B4-BE49-F238E27FC236}">
+                <a16:creationId xmlns:a16="http://schemas.microsoft.com/office/drawing/2014/main" id="{E33B40F0-CC59-474A-AA88-C53B1A538582}"/>
+              </a:ext>
+            </a:extLst>
+          </p:cNvPr>
+          <p:cNvSpPr/>
+          <p:nvPr/>
+        </p:nvSpPr>
+        <p:spPr>
+          <a:xfrm>
+            <a:off x="3830855" y="3048007"/>
+            <a:ext cx="1797468" cy="272578"/>
+          </a:xfrm>
+          <a:prstGeom prst="roundRect">
+            <a:avLst>
+              <a:gd name="adj" fmla="val 15087"/>
+            </a:avLst>
+          </a:prstGeom>
+        </p:spPr>
+        <p:style>
+          <a:lnRef idx="2">
+            <a:schemeClr val="dk1"/>
+          </a:lnRef>
+          <a:fillRef idx="1">
+            <a:schemeClr val="lt1"/>
+          </a:fillRef>
+          <a:effectRef idx="0">
+            <a:schemeClr val="dk1"/>
+          </a:effectRef>
+          <a:fontRef idx="minor">
+            <a:schemeClr val="dk1"/>
+          </a:fontRef>
+        </p:style>
+        <p:txBody>
+          <a:bodyPr rtlCol="0" anchor="ctr"/>
+          <a:lstStyle/>
+          <a:p>
+            <a:pPr algn="ctr"/>
+            <a:r>
+              <a:rPr lang="en-US" altLang="ko-KR" sz="1200"/>
+              <a:t>Routing Table</a:t>
+            </a:r>
+          </a:p>
+        </p:txBody>
+      </p:sp>
+      <p:cxnSp>
+        <p:nvCxnSpPr>
+          <p:cNvPr id="60" name="직선 화살표 연결선 59">
+            <a:extLst>
+              <a:ext uri="{FF2B5EF4-FFF2-40B4-BE49-F238E27FC236}">
+                <a16:creationId xmlns:a16="http://schemas.microsoft.com/office/drawing/2014/main" id="{25BD1BBC-C8BF-4BDA-92FD-8FB7DD99CF6D}"/>
+              </a:ext>
+            </a:extLst>
+          </p:cNvPr>
+          <p:cNvCxnSpPr>
+            <a:cxnSpLocks/>
+            <a:stCxn id="44" idx="3"/>
+            <a:endCxn id="59" idx="1"/>
+          </p:cNvCxnSpPr>
+          <p:nvPr/>
+        </p:nvCxnSpPr>
+        <p:spPr>
+          <a:xfrm>
+            <a:off x="3418507" y="3184296"/>
+            <a:ext cx="412348" cy="0"/>
+          </a:xfrm>
+          <a:prstGeom prst="straightConnector1">
+            <a:avLst/>
+          </a:prstGeom>
+          <a:ln w="28575">
+            <a:solidFill>
+              <a:schemeClr val="accent3">
+                <a:lumMod val="50000"/>
+              </a:schemeClr>
+            </a:solidFill>
+            <a:tailEnd type="arrow"/>
+          </a:ln>
+        </p:spPr>
+        <p:style>
+          <a:lnRef idx="1">
+            <a:schemeClr val="accent1"/>
+          </a:lnRef>
+          <a:fillRef idx="0">
+            <a:schemeClr val="accent1"/>
+          </a:fillRef>
+          <a:effectRef idx="0">
+            <a:schemeClr val="accent1"/>
+          </a:effectRef>
+          <a:fontRef idx="minor">
+            <a:schemeClr val="tx1"/>
+          </a:fontRef>
+        </p:style>
+      </p:cxnSp>
+      <p:cxnSp>
+        <p:nvCxnSpPr>
+          <p:cNvPr id="65" name="직선 화살표 연결선 64">
+            <a:extLst>
+              <a:ext uri="{FF2B5EF4-FFF2-40B4-BE49-F238E27FC236}">
+                <a16:creationId xmlns:a16="http://schemas.microsoft.com/office/drawing/2014/main" id="{95D75E12-2CF2-4604-8E3B-422E896E5B81}"/>
+              </a:ext>
+            </a:extLst>
+          </p:cNvPr>
+          <p:cNvCxnSpPr>
+            <a:cxnSpLocks/>
+            <a:stCxn id="52" idx="1"/>
+            <a:endCxn id="59" idx="3"/>
+          </p:cNvCxnSpPr>
+          <p:nvPr/>
+        </p:nvCxnSpPr>
+        <p:spPr>
+          <a:xfrm flipH="1">
+            <a:off x="5628323" y="3184296"/>
+            <a:ext cx="313194" cy="0"/>
+          </a:xfrm>
+          <a:prstGeom prst="straightConnector1">
+            <a:avLst/>
+          </a:prstGeom>
+          <a:ln w="28575">
+            <a:solidFill>
+              <a:schemeClr val="accent3">
+                <a:lumMod val="50000"/>
+              </a:schemeClr>
+            </a:solidFill>
+            <a:tailEnd type="arrow"/>
+          </a:ln>
+        </p:spPr>
+        <p:style>
+          <a:lnRef idx="1">
+            <a:schemeClr val="accent1"/>
+          </a:lnRef>
+          <a:fillRef idx="0">
+            <a:schemeClr val="accent1"/>
+          </a:fillRef>
+          <a:effectRef idx="0">
+            <a:schemeClr val="accent1"/>
+          </a:effectRef>
+          <a:fontRef idx="minor">
+            <a:schemeClr val="tx1"/>
+          </a:fontRef>
+        </p:style>
+      </p:cxnSp>
+      <p:sp>
+        <p:nvSpPr>
+          <p:cNvPr id="68" name="사각형: 둥근 모서리 67">
+            <a:extLst>
+              <a:ext uri="{FF2B5EF4-FFF2-40B4-BE49-F238E27FC236}">
+                <a16:creationId xmlns:a16="http://schemas.microsoft.com/office/drawing/2014/main" id="{4A3C5A43-9B60-48BA-8FAE-AB246B772EC2}"/>
+              </a:ext>
+            </a:extLst>
+          </p:cNvPr>
+          <p:cNvSpPr/>
+          <p:nvPr/>
+        </p:nvSpPr>
+        <p:spPr>
+          <a:xfrm>
+            <a:off x="1621039" y="3601658"/>
+            <a:ext cx="1797468" cy="272578"/>
+          </a:xfrm>
+          <a:prstGeom prst="roundRect">
+            <a:avLst>
+              <a:gd name="adj" fmla="val 15087"/>
+            </a:avLst>
+          </a:prstGeom>
+          <a:ln>
+            <a:solidFill>
+              <a:schemeClr val="tx2"/>
+            </a:solidFill>
+          </a:ln>
+        </p:spPr>
+        <p:style>
+          <a:lnRef idx="2">
+            <a:schemeClr val="dk1"/>
+          </a:lnRef>
+          <a:fillRef idx="1">
+            <a:schemeClr val="lt1"/>
+          </a:fillRef>
+          <a:effectRef idx="0">
+            <a:schemeClr val="dk1"/>
+          </a:effectRef>
+          <a:fontRef idx="minor">
+            <a:schemeClr val="dk1"/>
+          </a:fontRef>
+        </p:style>
+        <p:txBody>
+          <a:bodyPr rtlCol="0" anchor="ctr"/>
+          <a:lstStyle/>
+          <a:p>
+            <a:pPr algn="ctr"/>
+            <a:r>
+              <a:rPr lang="en-US" altLang="ko-KR" sz="1200">
+                <a:solidFill>
+                  <a:schemeClr val="tx2"/>
+                </a:solidFill>
+              </a:rPr>
+              <a:t>POSTROUTING</a:t>
+            </a:r>
+          </a:p>
+        </p:txBody>
+      </p:sp>
+      <p:sp>
+        <p:nvSpPr>
+          <p:cNvPr id="69" name="사각형: 둥근 모서리 68">
+            <a:extLst>
+              <a:ext uri="{FF2B5EF4-FFF2-40B4-BE49-F238E27FC236}">
+                <a16:creationId xmlns:a16="http://schemas.microsoft.com/office/drawing/2014/main" id="{F1BFD606-EF93-423C-8979-4AE50B68E33C}"/>
+              </a:ext>
+            </a:extLst>
+          </p:cNvPr>
+          <p:cNvSpPr/>
+          <p:nvPr/>
+        </p:nvSpPr>
+        <p:spPr>
+          <a:xfrm>
+            <a:off x="3830855" y="3606673"/>
+            <a:ext cx="1797468" cy="272578"/>
+          </a:xfrm>
+          <a:prstGeom prst="roundRect">
+            <a:avLst>
+              <a:gd name="adj" fmla="val 15087"/>
+            </a:avLst>
+          </a:prstGeom>
+          <a:ln>
+            <a:solidFill>
+              <a:schemeClr val="tx2"/>
+            </a:solidFill>
+          </a:ln>
+        </p:spPr>
+        <p:style>
+          <a:lnRef idx="2">
+            <a:schemeClr val="dk1"/>
+          </a:lnRef>
+          <a:fillRef idx="1">
+            <a:schemeClr val="lt1"/>
+          </a:fillRef>
+          <a:effectRef idx="0">
+            <a:schemeClr val="dk1"/>
+          </a:effectRef>
+          <a:fontRef idx="minor">
+            <a:schemeClr val="dk1"/>
+          </a:fontRef>
+        </p:style>
+        <p:txBody>
+          <a:bodyPr rtlCol="0" anchor="ctr"/>
+          <a:lstStyle/>
+          <a:p>
+            <a:pPr algn="ctr"/>
+            <a:r>
+              <a:rPr lang="en-US" altLang="ko-KR" sz="1200" b="1">
+                <a:solidFill>
+                  <a:schemeClr val="tx2"/>
+                </a:solidFill>
+              </a:rPr>
+              <a:t>KUBE-POSTROUTING</a:t>
+            </a:r>
+            <a:endParaRPr lang="ko-KR" altLang="en-US" sz="1200" b="1">
+              <a:solidFill>
+                <a:schemeClr val="tx2"/>
+              </a:solidFill>
+            </a:endParaRPr>
+          </a:p>
+        </p:txBody>
+      </p:sp>
+      <p:cxnSp>
+        <p:nvCxnSpPr>
+          <p:cNvPr id="70" name="직선 화살표 연결선 69">
+            <a:extLst>
+              <a:ext uri="{FF2B5EF4-FFF2-40B4-BE49-F238E27FC236}">
+                <a16:creationId xmlns:a16="http://schemas.microsoft.com/office/drawing/2014/main" id="{2053BE6F-B8CD-4760-8C54-B7BD87CB4BE8}"/>
+              </a:ext>
+            </a:extLst>
+          </p:cNvPr>
+          <p:cNvCxnSpPr>
+            <a:cxnSpLocks/>
+          </p:cNvCxnSpPr>
+          <p:nvPr/>
+        </p:nvCxnSpPr>
+        <p:spPr>
+          <a:xfrm flipH="1">
+            <a:off x="2363992" y="3320585"/>
+            <a:ext cx="2210498" cy="281073"/>
+          </a:xfrm>
+          <a:prstGeom prst="straightConnector1">
+            <a:avLst/>
+          </a:prstGeom>
+          <a:ln w="28575">
+            <a:solidFill>
+              <a:schemeClr val="tx1"/>
+            </a:solidFill>
+            <a:tailEnd type="arrow"/>
+          </a:ln>
+        </p:spPr>
+        <p:style>
+          <a:lnRef idx="1">
+            <a:schemeClr val="accent1"/>
+          </a:lnRef>
+          <a:fillRef idx="0">
+            <a:schemeClr val="accent1"/>
+          </a:fillRef>
+          <a:effectRef idx="0">
+            <a:schemeClr val="accent1"/>
+          </a:effectRef>
+          <a:fontRef idx="minor">
+            <a:schemeClr val="tx1"/>
+          </a:fontRef>
+        </p:style>
+      </p:cxnSp>
+      <p:cxnSp>
+        <p:nvCxnSpPr>
+          <p:cNvPr id="73" name="직선 화살표 연결선 72">
+            <a:extLst>
+              <a:ext uri="{FF2B5EF4-FFF2-40B4-BE49-F238E27FC236}">
+                <a16:creationId xmlns:a16="http://schemas.microsoft.com/office/drawing/2014/main" id="{E0ECBA20-7ADA-4A87-8F8A-7833EAD3E4F8}"/>
+              </a:ext>
+            </a:extLst>
+          </p:cNvPr>
+          <p:cNvCxnSpPr>
+            <a:cxnSpLocks/>
+            <a:stCxn id="68" idx="3"/>
+            <a:endCxn id="69" idx="1"/>
+          </p:cNvCxnSpPr>
+          <p:nvPr/>
+        </p:nvCxnSpPr>
+        <p:spPr>
+          <a:xfrm>
+            <a:off x="3418507" y="3737947"/>
+            <a:ext cx="412348" cy="5015"/>
+          </a:xfrm>
+          <a:prstGeom prst="straightConnector1">
+            <a:avLst/>
+          </a:prstGeom>
+          <a:ln w="28575">
+            <a:solidFill>
+              <a:schemeClr val="tx1"/>
+            </a:solidFill>
+            <a:tailEnd type="arrow"/>
+          </a:ln>
+        </p:spPr>
+        <p:style>
+          <a:lnRef idx="1">
+            <a:schemeClr val="accent1"/>
+          </a:lnRef>
+          <a:fillRef idx="0">
+            <a:schemeClr val="accent1"/>
+          </a:fillRef>
+          <a:effectRef idx="0">
+            <a:schemeClr val="accent1"/>
+          </a:effectRef>
+          <a:fontRef idx="minor">
+            <a:schemeClr val="tx1"/>
+          </a:fontRef>
+        </p:style>
+      </p:cxnSp>
+      <p:cxnSp>
+        <p:nvCxnSpPr>
+          <p:cNvPr id="98" name="직선 화살표 연결선 97">
+            <a:extLst>
+              <a:ext uri="{FF2B5EF4-FFF2-40B4-BE49-F238E27FC236}">
+                <a16:creationId xmlns:a16="http://schemas.microsoft.com/office/drawing/2014/main" id="{CE1E4AE7-5A8F-4454-A95F-F9104ED9E274}"/>
+              </a:ext>
+            </a:extLst>
+          </p:cNvPr>
+          <p:cNvCxnSpPr>
+            <a:cxnSpLocks/>
+            <a:stCxn id="51" idx="2"/>
+            <a:endCxn id="59" idx="0"/>
+          </p:cNvCxnSpPr>
+          <p:nvPr/>
+        </p:nvCxnSpPr>
+        <p:spPr>
+          <a:xfrm flipH="1">
+            <a:off x="4729589" y="2768665"/>
+            <a:ext cx="2110662" cy="279342"/>
+          </a:xfrm>
+          <a:prstGeom prst="straightConnector1">
+            <a:avLst/>
+          </a:prstGeom>
+          <a:ln w="28575">
+            <a:solidFill>
+              <a:srgbClr val="C00000"/>
+            </a:solidFill>
+            <a:tailEnd type="arrow"/>
+          </a:ln>
+        </p:spPr>
+        <p:style>
+          <a:lnRef idx="1">
+            <a:schemeClr val="accent1"/>
+          </a:lnRef>
+          <a:fillRef idx="0">
+            <a:schemeClr val="accent1"/>
+          </a:fillRef>
+          <a:effectRef idx="0">
+            <a:schemeClr val="accent1"/>
+          </a:effectRef>
+          <a:fontRef idx="minor">
+            <a:schemeClr val="tx1"/>
+          </a:fontRef>
+        </p:style>
+      </p:cxnSp>
+      <p:sp>
+        <p:nvSpPr>
+          <p:cNvPr id="62" name="자유형: 도형 61">
+            <a:extLst>
+              <a:ext uri="{FF2B5EF4-FFF2-40B4-BE49-F238E27FC236}">
+                <a16:creationId xmlns:a16="http://schemas.microsoft.com/office/drawing/2014/main" id="{EE01B692-1C4C-4BB4-886F-C319BF079EC1}"/>
+              </a:ext>
+            </a:extLst>
+          </p:cNvPr>
+          <p:cNvSpPr/>
+          <p:nvPr/>
+        </p:nvSpPr>
+        <p:spPr>
+          <a:xfrm>
+            <a:off x="5628322" y="1971501"/>
+            <a:ext cx="112999" cy="1701080"/>
+          </a:xfrm>
+          <a:custGeom>
+            <a:avLst/>
+            <a:gdLst>
+              <a:gd name="connsiteX0" fmla="*/ 0 w 152400"/>
+              <a:gd name="connsiteY0" fmla="*/ 1760220 h 1760220"/>
+              <a:gd name="connsiteX1" fmla="*/ 152400 w 152400"/>
+              <a:gd name="connsiteY1" fmla="*/ 1760220 h 1760220"/>
+              <a:gd name="connsiteX2" fmla="*/ 152400 w 152400"/>
+              <a:gd name="connsiteY2" fmla="*/ 0 h 1760220"/>
+              <a:gd name="connsiteX3" fmla="*/ 7620 w 152400"/>
+              <a:gd name="connsiteY3" fmla="*/ 0 h 1760220"/>
+            </a:gdLst>
+            <a:ahLst/>
+            <a:cxnLst>
+              <a:cxn ang="0">
+                <a:pos x="connsiteX0" y="connsiteY0"/>
+              </a:cxn>
+              <a:cxn ang="0">
+                <a:pos x="connsiteX1" y="connsiteY1"/>
+              </a:cxn>
+              <a:cxn ang="0">
+                <a:pos x="connsiteX2" y="connsiteY2"/>
+              </a:cxn>
+              <a:cxn ang="0">
+                <a:pos x="connsiteX3" y="connsiteY3"/>
+              </a:cxn>
+            </a:cxnLst>
+            <a:rect l="l" t="t" r="r" b="b"/>
+            <a:pathLst>
+              <a:path w="152400" h="1760220">
+                <a:moveTo>
+                  <a:pt x="0" y="1760220"/>
+                </a:moveTo>
+                <a:lnTo>
+                  <a:pt x="152400" y="1760220"/>
+                </a:lnTo>
+                <a:lnTo>
+                  <a:pt x="152400" y="0"/>
+                </a:lnTo>
+                <a:lnTo>
+                  <a:pt x="7620" y="0"/>
+                </a:lnTo>
+              </a:path>
+            </a:pathLst>
+          </a:custGeom>
+          <a:noFill/>
+          <a:ln w="28575">
+            <a:solidFill>
+              <a:schemeClr val="tx1"/>
+            </a:solidFill>
+            <a:headEnd type="none" w="med" len="med"/>
+            <a:tailEnd type="arrow" w="med" len="med"/>
+          </a:ln>
+        </p:spPr>
+        <p:style>
+          <a:lnRef idx="2">
+            <a:schemeClr val="accent1">
+              <a:shade val="50000"/>
+            </a:schemeClr>
+          </a:lnRef>
+          <a:fillRef idx="1">
+            <a:schemeClr val="accent1"/>
+          </a:fillRef>
+          <a:effectRef idx="0">
+            <a:schemeClr val="accent1"/>
+          </a:effectRef>
+          <a:fontRef idx="minor">
+            <a:schemeClr val="lt1"/>
+          </a:fontRef>
+        </p:style>
+        <p:txBody>
+          <a:bodyPr rtlCol="0" anchor="ctr"/>
+          <a:lstStyle/>
+          <a:p>
+            <a:pPr algn="ctr"/>
+            <a:endParaRPr lang="ko-KR" altLang="en-US"/>
+          </a:p>
+        </p:txBody>
+      </p:sp>
+      <p:cxnSp>
+        <p:nvCxnSpPr>
+          <p:cNvPr id="108" name="직선 화살표 연결선 107">
+            <a:extLst>
+              <a:ext uri="{FF2B5EF4-FFF2-40B4-BE49-F238E27FC236}">
+                <a16:creationId xmlns:a16="http://schemas.microsoft.com/office/drawing/2014/main" id="{315FFA37-8291-4AE6-8D06-066A4B8C556F}"/>
+              </a:ext>
+            </a:extLst>
+          </p:cNvPr>
+          <p:cNvCxnSpPr>
+            <a:cxnSpLocks/>
+          </p:cNvCxnSpPr>
+          <p:nvPr/>
+        </p:nvCxnSpPr>
+        <p:spPr>
+          <a:xfrm flipH="1">
+            <a:off x="4819966" y="2220317"/>
+            <a:ext cx="1" cy="212625"/>
+          </a:xfrm>
+          <a:prstGeom prst="straightConnector1">
+            <a:avLst/>
+          </a:prstGeom>
+          <a:ln w="28575">
+            <a:solidFill>
+              <a:schemeClr val="accent6">
+                <a:lumMod val="75000"/>
+              </a:schemeClr>
+            </a:solidFill>
+            <a:tailEnd type="arrow"/>
+          </a:ln>
+        </p:spPr>
+        <p:style>
+          <a:lnRef idx="1">
+            <a:schemeClr val="accent1"/>
+          </a:lnRef>
+          <a:fillRef idx="0">
+            <a:schemeClr val="accent1"/>
+          </a:fillRef>
+          <a:effectRef idx="0">
+            <a:schemeClr val="accent1"/>
+          </a:effectRef>
+          <a:fontRef idx="minor">
+            <a:schemeClr val="tx1"/>
+          </a:fontRef>
+        </p:style>
+      </p:cxnSp>
+      <p:cxnSp>
+        <p:nvCxnSpPr>
+          <p:cNvPr id="109" name="직선 화살표 연결선 108">
+            <a:extLst>
+              <a:ext uri="{FF2B5EF4-FFF2-40B4-BE49-F238E27FC236}">
+                <a16:creationId xmlns:a16="http://schemas.microsoft.com/office/drawing/2014/main" id="{014DD693-CBCD-4AFD-85A0-D1D0B2C90D49}"/>
+              </a:ext>
+            </a:extLst>
+          </p:cNvPr>
+          <p:cNvCxnSpPr>
+            <a:cxnSpLocks/>
+            <a:stCxn id="91" idx="3"/>
+            <a:endCxn id="51" idx="1"/>
+          </p:cNvCxnSpPr>
+          <p:nvPr/>
+        </p:nvCxnSpPr>
+        <p:spPr>
+          <a:xfrm>
+            <a:off x="5629005" y="2569231"/>
+            <a:ext cx="312512" cy="0"/>
+          </a:xfrm>
+          <a:prstGeom prst="straightConnector1">
+            <a:avLst/>
+          </a:prstGeom>
+          <a:ln w="28575">
+            <a:solidFill>
+              <a:srgbClr val="C00000"/>
+            </a:solidFill>
+            <a:tailEnd type="arrow"/>
+          </a:ln>
+        </p:spPr>
+        <p:style>
+          <a:lnRef idx="1">
+            <a:schemeClr val="accent1"/>
+          </a:lnRef>
+          <a:fillRef idx="0">
+            <a:schemeClr val="accent1"/>
+          </a:fillRef>
+          <a:effectRef idx="0">
+            <a:schemeClr val="accent1"/>
+          </a:effectRef>
+          <a:fontRef idx="minor">
+            <a:schemeClr val="tx1"/>
+          </a:fontRef>
+        </p:style>
+      </p:cxnSp>
+      <p:cxnSp>
+        <p:nvCxnSpPr>
+          <p:cNvPr id="116" name="직선 화살표 연결선 115">
+            <a:extLst>
+              <a:ext uri="{FF2B5EF4-FFF2-40B4-BE49-F238E27FC236}">
+                <a16:creationId xmlns:a16="http://schemas.microsoft.com/office/drawing/2014/main" id="{40011AB1-6AEE-47EF-B4FD-908539407507}"/>
+              </a:ext>
+            </a:extLst>
+          </p:cNvPr>
+          <p:cNvCxnSpPr>
+            <a:cxnSpLocks/>
+          </p:cNvCxnSpPr>
+          <p:nvPr/>
+        </p:nvCxnSpPr>
+        <p:spPr>
+          <a:xfrm flipH="1">
+            <a:off x="2688104" y="3320585"/>
+            <a:ext cx="2209816" cy="281073"/>
+          </a:xfrm>
+          <a:prstGeom prst="straightConnector1">
+            <a:avLst/>
+          </a:prstGeom>
+          <a:ln w="28575">
+            <a:solidFill>
+              <a:schemeClr val="accent6">
+                <a:lumMod val="75000"/>
+              </a:schemeClr>
+            </a:solidFill>
+            <a:tailEnd type="arrow"/>
+          </a:ln>
+        </p:spPr>
+        <p:style>
+          <a:lnRef idx="1">
+            <a:schemeClr val="accent1"/>
+          </a:lnRef>
+          <a:fillRef idx="0">
+            <a:schemeClr val="accent1"/>
+          </a:fillRef>
+          <a:effectRef idx="0">
+            <a:schemeClr val="accent1"/>
+          </a:effectRef>
+          <a:fontRef idx="minor">
+            <a:schemeClr val="tx1"/>
+          </a:fontRef>
+        </p:style>
+      </p:cxnSp>
+      <p:cxnSp>
+        <p:nvCxnSpPr>
+          <p:cNvPr id="118" name="직선 화살표 연결선 117">
+            <a:extLst>
+              <a:ext uri="{FF2B5EF4-FFF2-40B4-BE49-F238E27FC236}">
+                <a16:creationId xmlns:a16="http://schemas.microsoft.com/office/drawing/2014/main" id="{7919CB0C-D18E-4208-9BA9-3775652031EF}"/>
+              </a:ext>
+            </a:extLst>
+          </p:cNvPr>
+          <p:cNvCxnSpPr>
+            <a:cxnSpLocks/>
+          </p:cNvCxnSpPr>
+          <p:nvPr/>
+        </p:nvCxnSpPr>
+        <p:spPr>
+          <a:xfrm>
+            <a:off x="4729589" y="4011910"/>
+            <a:ext cx="0" cy="137169"/>
+          </a:xfrm>
+          <a:prstGeom prst="straightConnector1">
+            <a:avLst/>
+          </a:prstGeom>
+          <a:ln w="28575">
+            <a:solidFill>
+              <a:schemeClr val="accent6">
+                <a:lumMod val="75000"/>
+              </a:schemeClr>
+            </a:solidFill>
+            <a:tailEnd type="arrow"/>
+          </a:ln>
+        </p:spPr>
+        <p:style>
+          <a:lnRef idx="1">
+            <a:schemeClr val="accent1"/>
+          </a:lnRef>
+          <a:fillRef idx="0">
+            <a:schemeClr val="accent1"/>
+          </a:fillRef>
+          <a:effectRef idx="0">
+            <a:schemeClr val="accent1"/>
+          </a:effectRef>
+          <a:fontRef idx="minor">
+            <a:schemeClr val="tx1"/>
+          </a:fontRef>
+        </p:style>
+      </p:cxnSp>
+      <p:cxnSp>
+        <p:nvCxnSpPr>
+          <p:cNvPr id="54" name="직선 화살표 연결선 53">
+            <a:extLst>
+              <a:ext uri="{FF2B5EF4-FFF2-40B4-BE49-F238E27FC236}">
+                <a16:creationId xmlns:a16="http://schemas.microsoft.com/office/drawing/2014/main" id="{CB0C958C-F3EB-4DFC-AA04-68A5F8C84441}"/>
+              </a:ext>
+            </a:extLst>
+          </p:cNvPr>
+          <p:cNvCxnSpPr>
+            <a:cxnSpLocks/>
+            <a:stCxn id="41" idx="2"/>
+            <a:endCxn id="59" idx="0"/>
+          </p:cNvCxnSpPr>
+          <p:nvPr/>
+        </p:nvCxnSpPr>
+        <p:spPr>
+          <a:xfrm>
+            <a:off x="2519773" y="2768665"/>
+            <a:ext cx="2209816" cy="279342"/>
+          </a:xfrm>
+          <a:prstGeom prst="straightConnector1">
+            <a:avLst/>
+          </a:prstGeom>
+          <a:ln w="28575">
+            <a:solidFill>
+              <a:srgbClr val="C00000"/>
+            </a:solidFill>
+            <a:tailEnd type="arrow"/>
+          </a:ln>
+        </p:spPr>
+        <p:style>
+          <a:lnRef idx="1">
+            <a:schemeClr val="accent1"/>
+          </a:lnRef>
+          <a:fillRef idx="0">
+            <a:schemeClr val="accent1"/>
+          </a:fillRef>
+          <a:effectRef idx="0">
+            <a:schemeClr val="accent1"/>
+          </a:effectRef>
+          <a:fontRef idx="minor">
+            <a:schemeClr val="tx1"/>
+          </a:fontRef>
+        </p:style>
+      </p:cxnSp>
+      <p:sp>
+        <p:nvSpPr>
+          <p:cNvPr id="55" name="자유형: 도형 54">
+            <a:extLst>
+              <a:ext uri="{FF2B5EF4-FFF2-40B4-BE49-F238E27FC236}">
+                <a16:creationId xmlns:a16="http://schemas.microsoft.com/office/drawing/2014/main" id="{7D7FB2F7-FC20-4B0E-A7FC-4E98E6E5E45E}"/>
+              </a:ext>
+            </a:extLst>
+          </p:cNvPr>
+          <p:cNvSpPr/>
+          <p:nvPr/>
+        </p:nvSpPr>
+        <p:spPr>
+          <a:xfrm flipH="1">
+            <a:off x="1472012" y="1971501"/>
+            <a:ext cx="156762" cy="1212796"/>
+          </a:xfrm>
+          <a:custGeom>
+            <a:avLst/>
+            <a:gdLst>
+              <a:gd name="connsiteX0" fmla="*/ 0 w 152400"/>
+              <a:gd name="connsiteY0" fmla="*/ 1760220 h 1760220"/>
+              <a:gd name="connsiteX1" fmla="*/ 152400 w 152400"/>
+              <a:gd name="connsiteY1" fmla="*/ 1760220 h 1760220"/>
+              <a:gd name="connsiteX2" fmla="*/ 152400 w 152400"/>
+              <a:gd name="connsiteY2" fmla="*/ 0 h 1760220"/>
+              <a:gd name="connsiteX3" fmla="*/ 7620 w 152400"/>
+              <a:gd name="connsiteY3" fmla="*/ 0 h 1760220"/>
+            </a:gdLst>
+            <a:ahLst/>
+            <a:cxnLst>
+              <a:cxn ang="0">
+                <a:pos x="connsiteX0" y="connsiteY0"/>
+              </a:cxn>
+              <a:cxn ang="0">
+                <a:pos x="connsiteX1" y="connsiteY1"/>
+              </a:cxn>
+              <a:cxn ang="0">
+                <a:pos x="connsiteX2" y="connsiteY2"/>
+              </a:cxn>
+              <a:cxn ang="0">
+                <a:pos x="connsiteX3" y="connsiteY3"/>
+              </a:cxn>
+            </a:cxnLst>
+            <a:rect l="l" t="t" r="r" b="b"/>
+            <a:pathLst>
+              <a:path w="152400" h="1760220">
+                <a:moveTo>
+                  <a:pt x="0" y="1760220"/>
+                </a:moveTo>
+                <a:lnTo>
+                  <a:pt x="152400" y="1760220"/>
+                </a:lnTo>
+                <a:lnTo>
+                  <a:pt x="152400" y="0"/>
+                </a:lnTo>
+                <a:lnTo>
+                  <a:pt x="7620" y="0"/>
+                </a:lnTo>
+              </a:path>
+            </a:pathLst>
+          </a:custGeom>
+          <a:noFill/>
+          <a:ln w="28575">
+            <a:solidFill>
+              <a:schemeClr val="accent3">
+                <a:lumMod val="50000"/>
+              </a:schemeClr>
+            </a:solidFill>
+            <a:headEnd type="arrow" w="med" len="med"/>
+            <a:tailEnd type="none" w="med" len="med"/>
+          </a:ln>
+        </p:spPr>
+        <p:style>
+          <a:lnRef idx="2">
+            <a:schemeClr val="accent1">
+              <a:shade val="50000"/>
+            </a:schemeClr>
+          </a:lnRef>
+          <a:fillRef idx="1">
+            <a:schemeClr val="accent1"/>
+          </a:fillRef>
+          <a:effectRef idx="0">
+            <a:schemeClr val="accent1"/>
+          </a:effectRef>
+          <a:fontRef idx="minor">
+            <a:schemeClr val="lt1"/>
+          </a:fontRef>
+        </p:style>
+        <p:txBody>
+          <a:bodyPr rtlCol="0" anchor="ctr"/>
+          <a:lstStyle/>
+          <a:p>
+            <a:pPr algn="ctr"/>
+            <a:endParaRPr lang="ko-KR" altLang="en-US"/>
+          </a:p>
+        </p:txBody>
+      </p:sp>
+      <p:cxnSp>
+        <p:nvCxnSpPr>
+          <p:cNvPr id="63" name="직선 화살표 연결선 62">
+            <a:extLst>
+              <a:ext uri="{FF2B5EF4-FFF2-40B4-BE49-F238E27FC236}">
+                <a16:creationId xmlns:a16="http://schemas.microsoft.com/office/drawing/2014/main" id="{578F2765-3868-4A57-B08D-B574FD2D7F81}"/>
+              </a:ext>
+            </a:extLst>
+          </p:cNvPr>
+          <p:cNvCxnSpPr>
+            <a:cxnSpLocks/>
+            <a:stCxn id="91" idx="2"/>
+            <a:endCxn id="59" idx="0"/>
+          </p:cNvCxnSpPr>
+          <p:nvPr/>
+        </p:nvCxnSpPr>
+        <p:spPr>
+          <a:xfrm flipH="1">
+            <a:off x="4729589" y="2705520"/>
+            <a:ext cx="682" cy="342487"/>
+          </a:xfrm>
+          <a:prstGeom prst="straightConnector1">
+            <a:avLst/>
+          </a:prstGeom>
+          <a:ln w="28575">
+            <a:solidFill>
+              <a:schemeClr val="accent6">
+                <a:lumMod val="75000"/>
+              </a:schemeClr>
+            </a:solidFill>
+            <a:tailEnd type="arrow"/>
+          </a:ln>
+        </p:spPr>
+        <p:style>
+          <a:lnRef idx="1">
+            <a:schemeClr val="accent1"/>
+          </a:lnRef>
+          <a:fillRef idx="0">
+            <a:schemeClr val="accent1"/>
+          </a:fillRef>
+          <a:effectRef idx="0">
+            <a:schemeClr val="accent1"/>
+          </a:effectRef>
+          <a:fontRef idx="minor">
+            <a:schemeClr val="tx1"/>
+          </a:fontRef>
+        </p:style>
+      </p:cxnSp>
+      <p:grpSp>
+        <p:nvGrpSpPr>
+          <p:cNvPr id="88" name="그룹 87">
+            <a:extLst>
+              <a:ext uri="{FF2B5EF4-FFF2-40B4-BE49-F238E27FC236}">
+                <a16:creationId xmlns:a16="http://schemas.microsoft.com/office/drawing/2014/main" id="{ADECA633-5C4B-4C80-9051-5A8E110867CD}"/>
+              </a:ext>
+            </a:extLst>
+          </p:cNvPr>
+          <p:cNvGrpSpPr/>
+          <p:nvPr/>
+        </p:nvGrpSpPr>
+        <p:grpSpPr>
+          <a:xfrm>
+            <a:off x="5761780" y="4659982"/>
+            <a:ext cx="1258492" cy="276999"/>
+            <a:chOff x="6447669" y="4755407"/>
+            <a:chExt cx="1258492" cy="276999"/>
+          </a:xfrm>
+        </p:grpSpPr>
+        <p:cxnSp>
+          <p:nvCxnSpPr>
+            <p:cNvPr id="92" name="직선 화살표 연결선 91">
+              <a:extLst>
+                <a:ext uri="{FF2B5EF4-FFF2-40B4-BE49-F238E27FC236}">
+                  <a16:creationId xmlns:a16="http://schemas.microsoft.com/office/drawing/2014/main" id="{15DAF2FD-7F9E-42AD-8AC2-0FC66206527E}"/>
+                </a:ext>
+              </a:extLst>
+            </p:cNvPr>
+            <p:cNvCxnSpPr>
+              <a:cxnSpLocks/>
+            </p:cNvCxnSpPr>
+            <p:nvPr/>
+          </p:nvCxnSpPr>
+          <p:spPr>
+            <a:xfrm>
+              <a:off x="6447669" y="4898028"/>
+              <a:ext cx="284571" cy="0"/>
+            </a:xfrm>
+            <a:prstGeom prst="straightConnector1">
+              <a:avLst/>
+            </a:prstGeom>
+            <a:ln w="28575">
+              <a:solidFill>
+                <a:schemeClr val="accent6">
+                  <a:lumMod val="75000"/>
+                </a:schemeClr>
+              </a:solidFill>
+              <a:tailEnd type="arrow"/>
+            </a:ln>
+          </p:spPr>
+          <p:style>
+            <a:lnRef idx="1">
+              <a:schemeClr val="accent1"/>
+            </a:lnRef>
+            <a:fillRef idx="0">
+              <a:schemeClr val="accent1"/>
+            </a:fillRef>
+            <a:effectRef idx="0">
+              <a:schemeClr val="accent1"/>
+            </a:effectRef>
+            <a:fontRef idx="minor">
+              <a:schemeClr val="tx1"/>
+            </a:fontRef>
+          </p:style>
+        </p:cxnSp>
+        <p:sp>
+          <p:nvSpPr>
+            <p:cNvPr id="99" name="TextBox 98">
+              <a:extLst>
+                <a:ext uri="{FF2B5EF4-FFF2-40B4-BE49-F238E27FC236}">
+                  <a16:creationId xmlns:a16="http://schemas.microsoft.com/office/drawing/2014/main" id="{5D45A905-067B-4884-A271-EB61E46D5388}"/>
+                </a:ext>
+              </a:extLst>
+            </p:cNvPr>
+            <p:cNvSpPr txBox="1"/>
+            <p:nvPr/>
+          </p:nvSpPr>
+          <p:spPr>
+            <a:xfrm>
+              <a:off x="6732240" y="4755407"/>
+              <a:ext cx="973921" cy="276999"/>
+            </a:xfrm>
+            <a:prstGeom prst="rect">
+              <a:avLst/>
+            </a:prstGeom>
+            <a:noFill/>
+          </p:spPr>
+          <p:txBody>
+            <a:bodyPr wrap="none" rtlCol="0">
+              <a:spAutoFit/>
+            </a:bodyPr>
+            <a:lstStyle/>
+            <a:p>
+              <a:r>
+                <a:rPr lang="en-US" altLang="ko-KR" sz="1200"/>
+                <a:t>kube-proxy</a:t>
+              </a:r>
+              <a:endParaRPr lang="ko-KR" altLang="en-US" sz="1200"/>
+            </a:p>
+          </p:txBody>
+        </p:sp>
+      </p:grpSp>
+      <p:grpSp>
+        <p:nvGrpSpPr>
+          <p:cNvPr id="131" name="그룹 130">
+            <a:extLst>
+              <a:ext uri="{FF2B5EF4-FFF2-40B4-BE49-F238E27FC236}">
+                <a16:creationId xmlns:a16="http://schemas.microsoft.com/office/drawing/2014/main" id="{10E14AF2-7C79-4DF1-9589-1F08BC0543BC}"/>
+              </a:ext>
+            </a:extLst>
+          </p:cNvPr>
+          <p:cNvGrpSpPr/>
+          <p:nvPr/>
+        </p:nvGrpSpPr>
+        <p:grpSpPr>
+          <a:xfrm>
+            <a:off x="1950359" y="4448144"/>
+            <a:ext cx="1795015" cy="276999"/>
+            <a:chOff x="1600199" y="4764287"/>
+            <a:chExt cx="1795015" cy="276999"/>
+          </a:xfrm>
+        </p:grpSpPr>
+        <p:sp>
+          <p:nvSpPr>
+            <p:cNvPr id="132" name="사각형: 둥근 모서리 131">
+              <a:extLst>
+                <a:ext uri="{FF2B5EF4-FFF2-40B4-BE49-F238E27FC236}">
+                  <a16:creationId xmlns:a16="http://schemas.microsoft.com/office/drawing/2014/main" id="{20F62661-7780-4F7F-822E-A0EE2547C077}"/>
+                </a:ext>
+              </a:extLst>
+            </p:cNvPr>
+            <p:cNvSpPr/>
+            <p:nvPr/>
+          </p:nvSpPr>
+          <p:spPr>
+            <a:xfrm>
+              <a:off x="1600199" y="4823198"/>
+              <a:ext cx="310953" cy="160282"/>
+            </a:xfrm>
+            <a:prstGeom prst="roundRect">
+              <a:avLst>
+                <a:gd name="adj" fmla="val 15087"/>
+              </a:avLst>
+            </a:prstGeom>
+            <a:ln>
+              <a:solidFill>
+                <a:schemeClr val="tx2"/>
+              </a:solidFill>
+            </a:ln>
+          </p:spPr>
+          <p:style>
+            <a:lnRef idx="2">
+              <a:schemeClr val="dk1"/>
+            </a:lnRef>
+            <a:fillRef idx="1">
+              <a:schemeClr val="lt1"/>
+            </a:fillRef>
+            <a:effectRef idx="0">
+              <a:schemeClr val="dk1"/>
+            </a:effectRef>
+            <a:fontRef idx="minor">
+              <a:schemeClr val="dk1"/>
+            </a:fontRef>
+          </p:style>
+          <p:txBody>
+            <a:bodyPr rtlCol="0" anchor="ctr"/>
+            <a:lstStyle/>
+            <a:p>
+              <a:pPr algn="ctr"/>
+              <a:endParaRPr lang="en-US" altLang="ko-KR" sz="1200">
+                <a:solidFill>
+                  <a:schemeClr val="tx2"/>
+                </a:solidFill>
+              </a:endParaRPr>
+            </a:p>
+          </p:txBody>
+        </p:sp>
+        <p:sp>
+          <p:nvSpPr>
+            <p:cNvPr id="133" name="TextBox 132">
+              <a:extLst>
+                <a:ext uri="{FF2B5EF4-FFF2-40B4-BE49-F238E27FC236}">
+                  <a16:creationId xmlns:a16="http://schemas.microsoft.com/office/drawing/2014/main" id="{65CA59FC-A13E-4285-BE9C-16EE9F523DF5}"/>
+                </a:ext>
+              </a:extLst>
+            </p:cNvPr>
+            <p:cNvSpPr txBox="1"/>
+            <p:nvPr/>
+          </p:nvSpPr>
+          <p:spPr>
+            <a:xfrm>
+              <a:off x="1911153" y="4764287"/>
+              <a:ext cx="1484061" cy="276999"/>
+            </a:xfrm>
+            <a:prstGeom prst="rect">
+              <a:avLst/>
+            </a:prstGeom>
+            <a:noFill/>
+          </p:spPr>
+          <p:txBody>
+            <a:bodyPr wrap="none" rtlCol="0">
+              <a:spAutoFit/>
+            </a:bodyPr>
+            <a:lstStyle/>
+            <a:p>
+              <a:r>
+                <a:rPr lang="en-US" altLang="ko-KR" sz="1200"/>
+                <a:t>iptables NAT Table</a:t>
+              </a:r>
+              <a:endParaRPr lang="ko-KR" altLang="en-US" sz="1200"/>
+            </a:p>
+          </p:txBody>
+        </p:sp>
+      </p:grpSp>
+      <p:grpSp>
+        <p:nvGrpSpPr>
+          <p:cNvPr id="134" name="그룹 133">
+            <a:extLst>
+              <a:ext uri="{FF2B5EF4-FFF2-40B4-BE49-F238E27FC236}">
+                <a16:creationId xmlns:a16="http://schemas.microsoft.com/office/drawing/2014/main" id="{462F5019-9132-4CBA-813D-C2CB3E4AD88C}"/>
+              </a:ext>
+            </a:extLst>
+          </p:cNvPr>
+          <p:cNvGrpSpPr/>
+          <p:nvPr/>
+        </p:nvGrpSpPr>
+        <p:grpSpPr>
+          <a:xfrm>
+            <a:off x="3745374" y="4439264"/>
+            <a:ext cx="2023124" cy="276999"/>
+            <a:chOff x="3419872" y="4755407"/>
+            <a:chExt cx="2023124" cy="276999"/>
+          </a:xfrm>
+        </p:grpSpPr>
+        <p:cxnSp>
+          <p:nvCxnSpPr>
+            <p:cNvPr id="135" name="직선 화살표 연결선 134">
+              <a:extLst>
+                <a:ext uri="{FF2B5EF4-FFF2-40B4-BE49-F238E27FC236}">
+                  <a16:creationId xmlns:a16="http://schemas.microsoft.com/office/drawing/2014/main" id="{FCB2219F-163E-45BD-A261-43F35F8AB83D}"/>
+                </a:ext>
+              </a:extLst>
+            </p:cNvPr>
+            <p:cNvCxnSpPr>
+              <a:cxnSpLocks/>
+            </p:cNvCxnSpPr>
+            <p:nvPr/>
+          </p:nvCxnSpPr>
+          <p:spPr>
+            <a:xfrm>
+              <a:off x="3419872" y="4898028"/>
+              <a:ext cx="284571" cy="0"/>
+            </a:xfrm>
+            <a:prstGeom prst="straightConnector1">
+              <a:avLst/>
+            </a:prstGeom>
+            <a:ln w="28575">
+              <a:solidFill>
+                <a:schemeClr val="tx1"/>
+              </a:solidFill>
+              <a:tailEnd type="arrow"/>
+            </a:ln>
+          </p:spPr>
+          <p:style>
+            <a:lnRef idx="1">
+              <a:schemeClr val="accent1"/>
+            </a:lnRef>
+            <a:fillRef idx="0">
+              <a:schemeClr val="accent1"/>
+            </a:fillRef>
+            <a:effectRef idx="0">
+              <a:schemeClr val="accent1"/>
+            </a:effectRef>
+            <a:fontRef idx="minor">
+              <a:schemeClr val="tx1"/>
+            </a:fontRef>
+          </p:style>
+        </p:cxnSp>
+        <p:sp>
+          <p:nvSpPr>
+            <p:cNvPr id="136" name="TextBox 135">
+              <a:extLst>
+                <a:ext uri="{FF2B5EF4-FFF2-40B4-BE49-F238E27FC236}">
+                  <a16:creationId xmlns:a16="http://schemas.microsoft.com/office/drawing/2014/main" id="{5ED7BFC2-9B27-452E-B09A-DE691672A47A}"/>
+                </a:ext>
+              </a:extLst>
+            </p:cNvPr>
+            <p:cNvSpPr txBox="1"/>
+            <p:nvPr/>
+          </p:nvSpPr>
+          <p:spPr>
+            <a:xfrm>
+              <a:off x="3704443" y="4755407"/>
+              <a:ext cx="1738553" cy="276999"/>
+            </a:xfrm>
+            <a:prstGeom prst="rect">
+              <a:avLst/>
+            </a:prstGeom>
+            <a:noFill/>
+          </p:spPr>
+          <p:txBody>
+            <a:bodyPr wrap="none" rtlCol="0">
+              <a:spAutoFit/>
+            </a:bodyPr>
+            <a:lstStyle/>
+            <a:p>
+              <a:r>
+                <a:rPr lang="en-US" altLang="ko-KR" sz="1200"/>
+                <a:t>ClusterIP + NodePort</a:t>
+              </a:r>
+              <a:endParaRPr lang="ko-KR" altLang="en-US" sz="1200"/>
+            </a:p>
+          </p:txBody>
+        </p:sp>
+      </p:grpSp>
+      <p:grpSp>
+        <p:nvGrpSpPr>
+          <p:cNvPr id="137" name="그룹 136">
+            <a:extLst>
+              <a:ext uri="{FF2B5EF4-FFF2-40B4-BE49-F238E27FC236}">
+                <a16:creationId xmlns:a16="http://schemas.microsoft.com/office/drawing/2014/main" id="{E97C35BA-145F-4EB4-96F6-AA9A2C033F30}"/>
+              </a:ext>
+            </a:extLst>
+          </p:cNvPr>
+          <p:cNvGrpSpPr/>
+          <p:nvPr/>
+        </p:nvGrpSpPr>
+        <p:grpSpPr>
+          <a:xfrm>
+            <a:off x="5761598" y="4439264"/>
+            <a:ext cx="1080302" cy="276999"/>
+            <a:chOff x="5371509" y="4755407"/>
+            <a:chExt cx="1080302" cy="276999"/>
+          </a:xfrm>
+        </p:grpSpPr>
+        <p:cxnSp>
+          <p:nvCxnSpPr>
+            <p:cNvPr id="138" name="직선 화살표 연결선 137">
+              <a:extLst>
+                <a:ext uri="{FF2B5EF4-FFF2-40B4-BE49-F238E27FC236}">
+                  <a16:creationId xmlns:a16="http://schemas.microsoft.com/office/drawing/2014/main" id="{947D274C-40D4-4285-8D62-4AB56D5C0037}"/>
+                </a:ext>
+              </a:extLst>
+            </p:cNvPr>
+            <p:cNvCxnSpPr>
+              <a:cxnSpLocks/>
+            </p:cNvCxnSpPr>
+            <p:nvPr/>
+          </p:nvCxnSpPr>
+          <p:spPr>
+            <a:xfrm>
+              <a:off x="5371509" y="4898028"/>
+              <a:ext cx="284571" cy="0"/>
+            </a:xfrm>
+            <a:prstGeom prst="straightConnector1">
+              <a:avLst/>
+            </a:prstGeom>
+            <a:ln w="28575">
+              <a:solidFill>
+                <a:srgbClr val="C00000"/>
+              </a:solidFill>
+              <a:tailEnd type="arrow"/>
+            </a:ln>
+          </p:spPr>
+          <p:style>
+            <a:lnRef idx="1">
+              <a:schemeClr val="accent1"/>
+            </a:lnRef>
+            <a:fillRef idx="0">
+              <a:schemeClr val="accent1"/>
+            </a:fillRef>
+            <a:effectRef idx="0">
+              <a:schemeClr val="accent1"/>
+            </a:effectRef>
+            <a:fontRef idx="minor">
+              <a:schemeClr val="tx1"/>
+            </a:fontRef>
+          </p:style>
+        </p:cxnSp>
+        <p:sp>
+          <p:nvSpPr>
+            <p:cNvPr id="139" name="TextBox 138">
+              <a:extLst>
+                <a:ext uri="{FF2B5EF4-FFF2-40B4-BE49-F238E27FC236}">
+                  <a16:creationId xmlns:a16="http://schemas.microsoft.com/office/drawing/2014/main" id="{0877781A-3B2E-4A37-BB4D-7D16B4771FC5}"/>
+                </a:ext>
+              </a:extLst>
+            </p:cNvPr>
+            <p:cNvSpPr txBox="1"/>
+            <p:nvPr/>
+          </p:nvSpPr>
+          <p:spPr>
+            <a:xfrm>
+              <a:off x="5656080" y="4755407"/>
+              <a:ext cx="795731" cy="276999"/>
+            </a:xfrm>
+            <a:prstGeom prst="rect">
+              <a:avLst/>
+            </a:prstGeom>
+            <a:noFill/>
+          </p:spPr>
+          <p:txBody>
+            <a:bodyPr wrap="none" rtlCol="0">
+              <a:spAutoFit/>
+            </a:bodyPr>
+            <a:lstStyle/>
+            <a:p>
+              <a:r>
+                <a:rPr lang="en-US" altLang="ko-KR" sz="1200"/>
+                <a:t>ClusterIP</a:t>
+              </a:r>
+              <a:endParaRPr lang="ko-KR" altLang="en-US" sz="1200"/>
+            </a:p>
+          </p:txBody>
+        </p:sp>
+      </p:grpSp>
+      <p:grpSp>
+        <p:nvGrpSpPr>
+          <p:cNvPr id="140" name="그룹 139">
+            <a:extLst>
+              <a:ext uri="{FF2B5EF4-FFF2-40B4-BE49-F238E27FC236}">
+                <a16:creationId xmlns:a16="http://schemas.microsoft.com/office/drawing/2014/main" id="{9E606017-EDFA-4223-9F8C-1EDCDBE120DB}"/>
+              </a:ext>
+            </a:extLst>
+          </p:cNvPr>
+          <p:cNvGrpSpPr/>
+          <p:nvPr/>
+        </p:nvGrpSpPr>
+        <p:grpSpPr>
+          <a:xfrm>
+            <a:off x="3745556" y="4663727"/>
+            <a:ext cx="1141152" cy="276999"/>
+            <a:chOff x="6447669" y="4755407"/>
+            <a:chExt cx="1141152" cy="276999"/>
+          </a:xfrm>
+        </p:grpSpPr>
+        <p:cxnSp>
+          <p:nvCxnSpPr>
+            <p:cNvPr id="141" name="직선 화살표 연결선 140">
+              <a:extLst>
+                <a:ext uri="{FF2B5EF4-FFF2-40B4-BE49-F238E27FC236}">
+                  <a16:creationId xmlns:a16="http://schemas.microsoft.com/office/drawing/2014/main" id="{2334F303-924B-4682-8C1D-ED8AB48CE312}"/>
+                </a:ext>
+              </a:extLst>
+            </p:cNvPr>
+            <p:cNvCxnSpPr>
+              <a:cxnSpLocks/>
+            </p:cNvCxnSpPr>
+            <p:nvPr/>
+          </p:nvCxnSpPr>
+          <p:spPr>
+            <a:xfrm>
+              <a:off x="6447669" y="4898028"/>
+              <a:ext cx="284571" cy="0"/>
+            </a:xfrm>
+            <a:prstGeom prst="straightConnector1">
+              <a:avLst/>
+            </a:prstGeom>
+            <a:ln w="28575">
+              <a:solidFill>
+                <a:schemeClr val="accent3">
+                  <a:lumMod val="50000"/>
+                </a:schemeClr>
+              </a:solidFill>
+              <a:tailEnd type="arrow"/>
+            </a:ln>
+          </p:spPr>
+          <p:style>
+            <a:lnRef idx="1">
+              <a:schemeClr val="accent1"/>
+            </a:lnRef>
+            <a:fillRef idx="0">
+              <a:schemeClr val="accent1"/>
+            </a:fillRef>
+            <a:effectRef idx="0">
+              <a:schemeClr val="accent1"/>
+            </a:effectRef>
+            <a:fontRef idx="minor">
+              <a:schemeClr val="tx1"/>
+            </a:fontRef>
+          </p:style>
+        </p:cxnSp>
+        <p:sp>
+          <p:nvSpPr>
+            <p:cNvPr id="142" name="TextBox 141">
+              <a:extLst>
+                <a:ext uri="{FF2B5EF4-FFF2-40B4-BE49-F238E27FC236}">
+                  <a16:creationId xmlns:a16="http://schemas.microsoft.com/office/drawing/2014/main" id="{488501D5-6C72-41FD-8266-7DB2C9AA94E1}"/>
+                </a:ext>
+              </a:extLst>
+            </p:cNvPr>
+            <p:cNvSpPr txBox="1"/>
+            <p:nvPr/>
+          </p:nvSpPr>
+          <p:spPr>
+            <a:xfrm>
+              <a:off x="6732240" y="4755407"/>
+              <a:ext cx="856581" cy="276999"/>
+            </a:xfrm>
+            <a:prstGeom prst="rect">
+              <a:avLst/>
+            </a:prstGeom>
+            <a:noFill/>
+          </p:spPr>
+          <p:txBody>
+            <a:bodyPr wrap="none" rtlCol="0">
+              <a:spAutoFit/>
+            </a:bodyPr>
+            <a:lstStyle/>
+            <a:p>
+              <a:r>
+                <a:rPr lang="en-US" altLang="ko-KR" sz="1200"/>
+                <a:t>NodePort</a:t>
+              </a:r>
+            </a:p>
+          </p:txBody>
+        </p:sp>
+      </p:grpSp>
+      <p:sp>
+        <p:nvSpPr>
+          <p:cNvPr id="143" name="자유형: 도형 142">
+            <a:extLst>
+              <a:ext uri="{FF2B5EF4-FFF2-40B4-BE49-F238E27FC236}">
+                <a16:creationId xmlns:a16="http://schemas.microsoft.com/office/drawing/2014/main" id="{2942F970-F54D-4627-A45F-096FA4B42AD3}"/>
+              </a:ext>
+            </a:extLst>
+          </p:cNvPr>
+          <p:cNvSpPr/>
+          <p:nvPr/>
+        </p:nvSpPr>
+        <p:spPr>
+          <a:xfrm>
+            <a:off x="2527300" y="1579860"/>
+            <a:ext cx="5448300" cy="2432050"/>
+          </a:xfrm>
+          <a:custGeom>
+            <a:avLst/>
+            <a:gdLst>
+              <a:gd name="connsiteX0" fmla="*/ 0 w 5448300"/>
+              <a:gd name="connsiteY0" fmla="*/ 2292350 h 2432050"/>
+              <a:gd name="connsiteX1" fmla="*/ 0 w 5448300"/>
+              <a:gd name="connsiteY1" fmla="*/ 2432050 h 2432050"/>
+              <a:gd name="connsiteX2" fmla="*/ 5448300 w 5448300"/>
+              <a:gd name="connsiteY2" fmla="*/ 2432050 h 2432050"/>
+              <a:gd name="connsiteX3" fmla="*/ 5448300 w 5448300"/>
+              <a:gd name="connsiteY3" fmla="*/ 171450 h 2432050"/>
+              <a:gd name="connsiteX4" fmla="*/ 4311650 w 5448300"/>
+              <a:gd name="connsiteY4" fmla="*/ 171450 h 2432050"/>
+              <a:gd name="connsiteX5" fmla="*/ 4311650 w 5448300"/>
+              <a:gd name="connsiteY5" fmla="*/ 0 h 2432050"/>
+            </a:gdLst>
+            <a:ahLst/>
+            <a:cxnLst>
+              <a:cxn ang="0">
+                <a:pos x="connsiteX0" y="connsiteY0"/>
+              </a:cxn>
+              <a:cxn ang="0">
+                <a:pos x="connsiteX1" y="connsiteY1"/>
+              </a:cxn>
+              <a:cxn ang="0">
+                <a:pos x="connsiteX2" y="connsiteY2"/>
+              </a:cxn>
+              <a:cxn ang="0">
+                <a:pos x="connsiteX3" y="connsiteY3"/>
+              </a:cxn>
+              <a:cxn ang="0">
+                <a:pos x="connsiteX4" y="connsiteY4"/>
+              </a:cxn>
+              <a:cxn ang="0">
+                <a:pos x="connsiteX5" y="connsiteY5"/>
+              </a:cxn>
+            </a:cxnLst>
+            <a:rect l="l" t="t" r="r" b="b"/>
+            <a:pathLst>
+              <a:path w="5448300" h="2432050">
+                <a:moveTo>
+                  <a:pt x="0" y="2292350"/>
+                </a:moveTo>
+                <a:lnTo>
+                  <a:pt x="0" y="2432050"/>
+                </a:lnTo>
+                <a:lnTo>
+                  <a:pt x="5448300" y="2432050"/>
+                </a:lnTo>
+                <a:lnTo>
+                  <a:pt x="5448300" y="171450"/>
+                </a:lnTo>
+                <a:lnTo>
+                  <a:pt x="4311650" y="171450"/>
+                </a:lnTo>
+                <a:lnTo>
+                  <a:pt x="4311650" y="0"/>
+                </a:lnTo>
+              </a:path>
+            </a:pathLst>
+          </a:custGeom>
+          <a:noFill/>
+          <a:ln w="28575">
+            <a:solidFill>
+              <a:schemeClr val="accent6">
+                <a:lumMod val="75000"/>
+              </a:schemeClr>
+            </a:solidFill>
+            <a:headEnd type="none" w="med" len="med"/>
+            <a:tailEnd type="arrow" w="med" len="med"/>
+          </a:ln>
+        </p:spPr>
+        <p:style>
+          <a:lnRef idx="2">
+            <a:schemeClr val="accent1">
+              <a:shade val="50000"/>
+            </a:schemeClr>
+          </a:lnRef>
+          <a:fillRef idx="1">
+            <a:schemeClr val="accent1"/>
+          </a:fillRef>
+          <a:effectRef idx="0">
+            <a:schemeClr val="accent1"/>
+          </a:effectRef>
+          <a:fontRef idx="minor">
+            <a:schemeClr val="lt1"/>
+          </a:fontRef>
+        </p:style>
+        <p:txBody>
+          <a:bodyPr rtlCol="0" anchor="ctr"/>
+          <a:lstStyle/>
+          <a:p>
+            <a:pPr algn="ctr"/>
+            <a:endParaRPr lang="ko-KR" altLang="en-US"/>
+          </a:p>
+        </p:txBody>
+      </p:sp>
+    </p:spTree>
+    <p:extLst>
+      <p:ext uri="{BB962C8B-B14F-4D97-AF65-F5344CB8AC3E}">
+        <p14:creationId xmlns:p14="http://schemas.microsoft.com/office/powerpoint/2010/main" val="504294846"/>
+      </p:ext>
+    </p:extLst>
+  </p:cSld>
+  <p:clrMapOvr>
+    <a:masterClrMapping/>
+  </p:clrMapOvr>
+</p:sld>
+</file>
+
+<file path=ppt/slides/slide4.xml><?xml version="1.0" encoding="utf-8"?>
+<p:sld xmlns:a="http://schemas.openxmlformats.org/drawingml/2006/main" xmlns:r="http://schemas.openxmlformats.org/officeDocument/2006/relationships" xmlns:p="http://schemas.openxmlformats.org/presentationml/2006/main">
+  <p:cSld>
+    <p:spTree>
+      <p:nvGrpSpPr>
+        <p:cNvPr id="1" name=""/>
+        <p:cNvGrpSpPr/>
+        <p:nvPr/>
+      </p:nvGrpSpPr>
+      <p:grpSpPr>
+        <a:xfrm>
+          <a:off x="0" y="0"/>
+          <a:ext cx="0" cy="0"/>
+          <a:chOff x="0" y="0"/>
+          <a:chExt cx="0" cy="0"/>
+        </a:xfrm>
+      </p:grpSpPr>
+      <p:sp>
+        <p:nvSpPr>
+          <p:cNvPr id="2" name="제목 1">
+            <a:extLst>
+              <a:ext uri="{FF2B5EF4-FFF2-40B4-BE49-F238E27FC236}">
+                <a16:creationId xmlns:a16="http://schemas.microsoft.com/office/drawing/2014/main" id="{692B629B-1366-415A-9046-F69FF5677508}"/>
+              </a:ext>
+            </a:extLst>
+          </p:cNvPr>
+          <p:cNvSpPr>
+            <a:spLocks noGrp="1"/>
+          </p:cNvSpPr>
+          <p:nvPr>
+            <p:ph type="title"/>
+          </p:nvPr>
+        </p:nvSpPr>
+        <p:spPr/>
+        <p:txBody>
+          <a:bodyPr/>
+          <a:lstStyle/>
+          <a:p>
+            <a:endParaRPr lang="ko-KR" altLang="en-US"/>
+          </a:p>
+        </p:txBody>
+      </p:sp>
+      <p:sp>
+        <p:nvSpPr>
+          <p:cNvPr id="3" name="내용 개체 틀 2">
+            <a:extLst>
+              <a:ext uri="{FF2B5EF4-FFF2-40B4-BE49-F238E27FC236}">
+                <a16:creationId xmlns:a16="http://schemas.microsoft.com/office/drawing/2014/main" id="{690CB4A6-A03B-41F9-A9D3-D58DA0199888}"/>
+              </a:ext>
+            </a:extLst>
+          </p:cNvPr>
+          <p:cNvSpPr>
+            <a:spLocks noGrp="1"/>
+          </p:cNvSpPr>
+          <p:nvPr>
+            <p:ph idx="1"/>
+          </p:nvPr>
+        </p:nvSpPr>
+        <p:spPr/>
+        <p:txBody>
+          <a:bodyPr/>
+          <a:lstStyle/>
+          <a:p>
+            <a:endParaRPr lang="ko-KR" altLang="en-US"/>
+          </a:p>
+        </p:txBody>
+      </p:sp>
+    </p:spTree>
+    <p:extLst>
+      <p:ext uri="{BB962C8B-B14F-4D97-AF65-F5344CB8AC3E}">
+        <p14:creationId xmlns:p14="http://schemas.microsoft.com/office/powerpoint/2010/main" val="2719450338"/>
+      </p:ext>
+    </p:extLst>
+  </p:cSld>
+  <p:clrMapOvr>
+    <a:masterClrMapping/>
+  </p:clrMapOvr>
+</p:sld>
+</file>
+
+<file path=ppt/slides/slide5.xml><?xml version="1.0" encoding="utf-8"?>
+<p:sld xmlns:a="http://schemas.openxmlformats.org/drawingml/2006/main" xmlns:r="http://schemas.openxmlformats.org/officeDocument/2006/relationships" xmlns:p="http://schemas.openxmlformats.org/presentationml/2006/main">
+  <p:cSld>
+    <p:spTree>
+      <p:nvGrpSpPr>
+        <p:cNvPr id="1" name=""/>
+        <p:cNvGrpSpPr/>
+        <p:nvPr/>
+      </p:nvGrpSpPr>
+      <p:grpSpPr>
+        <a:xfrm>
+          <a:off x="0" y="0"/>
+          <a:ext cx="0" cy="0"/>
+          <a:chOff x="0" y="0"/>
+          <a:chExt cx="0" cy="0"/>
+        </a:xfrm>
+      </p:grpSpPr>
+      <p:sp>
+        <p:nvSpPr>
+          <p:cNvPr id="26" name="제목 1">
+            <a:extLst>
+              <a:ext uri="{FF2B5EF4-FFF2-40B4-BE49-F238E27FC236}">
+                <a16:creationId xmlns:a16="http://schemas.microsoft.com/office/drawing/2014/main" id="{8996A3B6-EF2F-433F-A247-A77B4E18237E}"/>
+              </a:ext>
+            </a:extLst>
+          </p:cNvPr>
+          <p:cNvSpPr>
+            <a:spLocks noGrp="1"/>
+          </p:cNvSpPr>
+          <p:nvPr>
+            <p:ph type="title"/>
+          </p:nvPr>
+        </p:nvSpPr>
+        <p:spPr>
+          <a:xfrm>
             <a:off x="457200" y="-236562"/>
             <a:ext cx="8229600" cy="857250"/>
           </a:xfrm>
@@ -12052,7 +15050,7 @@
 </p:sld>
 </file>
 
-<file path=ppt/slides/slide4.xml><?xml version="1.0" encoding="utf-8"?>
+<file path=ppt/slides/slide6.xml><?xml version="1.0" encoding="utf-8"?>
 <p:sld xmlns:a="http://schemas.openxmlformats.org/drawingml/2006/main" xmlns:r="http://schemas.openxmlformats.org/officeDocument/2006/relationships" xmlns:p="http://schemas.openxmlformats.org/presentationml/2006/main">
   <p:cSld>
     <p:spTree>
@@ -12071,86 +15069,6 @@
       </p:grpSpPr>
       <p:sp>
         <p:nvSpPr>
-          <p:cNvPr id="2" name="제목 1">
-            <a:extLst>
-              <a:ext uri="{FF2B5EF4-FFF2-40B4-BE49-F238E27FC236}">
-                <a16:creationId xmlns:a16="http://schemas.microsoft.com/office/drawing/2014/main" id="{692B629B-1366-415A-9046-F69FF5677508}"/>
-              </a:ext>
-            </a:extLst>
-          </p:cNvPr>
-          <p:cNvSpPr>
-            <a:spLocks noGrp="1"/>
-          </p:cNvSpPr>
-          <p:nvPr>
-            <p:ph type="title"/>
-          </p:nvPr>
-        </p:nvSpPr>
-        <p:spPr/>
-        <p:txBody>
-          <a:bodyPr/>
-          <a:lstStyle/>
-          <a:p>
-            <a:endParaRPr lang="ko-KR" altLang="en-US"/>
-          </a:p>
-        </p:txBody>
-      </p:sp>
-      <p:sp>
-        <p:nvSpPr>
-          <p:cNvPr id="3" name="내용 개체 틀 2">
-            <a:extLst>
-              <a:ext uri="{FF2B5EF4-FFF2-40B4-BE49-F238E27FC236}">
-                <a16:creationId xmlns:a16="http://schemas.microsoft.com/office/drawing/2014/main" id="{690CB4A6-A03B-41F9-A9D3-D58DA0199888}"/>
-              </a:ext>
-            </a:extLst>
-          </p:cNvPr>
-          <p:cNvSpPr>
-            <a:spLocks noGrp="1"/>
-          </p:cNvSpPr>
-          <p:nvPr>
-            <p:ph idx="1"/>
-          </p:nvPr>
-        </p:nvSpPr>
-        <p:spPr/>
-        <p:txBody>
-          <a:bodyPr/>
-          <a:lstStyle/>
-          <a:p>
-            <a:endParaRPr lang="ko-KR" altLang="en-US"/>
-          </a:p>
-        </p:txBody>
-      </p:sp>
-    </p:spTree>
-    <p:extLst>
-      <p:ext uri="{BB962C8B-B14F-4D97-AF65-F5344CB8AC3E}">
-        <p14:creationId xmlns:p14="http://schemas.microsoft.com/office/powerpoint/2010/main" val="2719450338"/>
-      </p:ext>
-    </p:extLst>
-  </p:cSld>
-  <p:clrMapOvr>
-    <a:masterClrMapping/>
-  </p:clrMapOvr>
-</p:sld>
-</file>
-
-<file path=ppt/slides/slide5.xml><?xml version="1.0" encoding="utf-8"?>
-<p:sld xmlns:a="http://schemas.openxmlformats.org/drawingml/2006/main" xmlns:r="http://schemas.openxmlformats.org/officeDocument/2006/relationships" xmlns:p="http://schemas.openxmlformats.org/presentationml/2006/main">
-  <p:cSld>
-    <p:spTree>
-      <p:nvGrpSpPr>
-        <p:cNvPr id="1" name=""/>
-        <p:cNvGrpSpPr/>
-        <p:nvPr/>
-      </p:nvGrpSpPr>
-      <p:grpSpPr>
-        <a:xfrm>
-          <a:off x="0" y="0"/>
-          <a:ext cx="0" cy="0"/>
-          <a:chOff x="0" y="0"/>
-          <a:chExt cx="0" cy="0"/>
-        </a:xfrm>
-      </p:grpSpPr>
-      <p:sp>
-        <p:nvSpPr>
           <p:cNvPr id="23" name="모서리가 둥근 직사각형 13">
             <a:extLst>
               <a:ext uri="{FF2B5EF4-FFF2-40B4-BE49-F238E27FC236}">
@@ -13703,7 +16621,7 @@
 </p:sld>
 </file>
 
-<file path=ppt/slides/slide6.xml><?xml version="1.0" encoding="utf-8"?>
+<file path=ppt/slides/slide7.xml><?xml version="1.0" encoding="utf-8"?>
 <p:sld xmlns:a="http://schemas.openxmlformats.org/drawingml/2006/main" xmlns:r="http://schemas.openxmlformats.org/officeDocument/2006/relationships" xmlns:p="http://schemas.openxmlformats.org/presentationml/2006/main">
   <p:cSld>
     <p:spTree>

</xml_diff>